<commit_message>
Rename few names in ISP example
</commit_message>
<xml_diff>
--- a/SOLID PRINCIPLES_NEW.pptx
+++ b/SOLID PRINCIPLES_NEW.pptx
@@ -5,32 +5,33 @@
     <p:sldMasterId id="2147483660" r:id="rId1"/>
   </p:sldMasterIdLst>
   <p:notesMasterIdLst>
-    <p:notesMasterId r:id="rId22"/>
+    <p:notesMasterId r:id="rId23"/>
   </p:notesMasterIdLst>
   <p:handoutMasterIdLst>
-    <p:handoutMasterId r:id="rId23"/>
+    <p:handoutMasterId r:id="rId24"/>
   </p:handoutMasterIdLst>
   <p:sldIdLst>
     <p:sldId id="256" r:id="rId2"/>
     <p:sldId id="281" r:id="rId3"/>
     <p:sldId id="271" r:id="rId4"/>
-    <p:sldId id="293" r:id="rId5"/>
-    <p:sldId id="294" r:id="rId6"/>
-    <p:sldId id="283" r:id="rId7"/>
-    <p:sldId id="284" r:id="rId8"/>
-    <p:sldId id="279" r:id="rId9"/>
-    <p:sldId id="280" r:id="rId10"/>
-    <p:sldId id="275" r:id="rId11"/>
-    <p:sldId id="285" r:id="rId12"/>
-    <p:sldId id="286" r:id="rId13"/>
-    <p:sldId id="287" r:id="rId14"/>
-    <p:sldId id="288" r:id="rId15"/>
-    <p:sldId id="289" r:id="rId16"/>
-    <p:sldId id="290" r:id="rId17"/>
-    <p:sldId id="291" r:id="rId18"/>
-    <p:sldId id="292" r:id="rId19"/>
-    <p:sldId id="295" r:id="rId20"/>
-    <p:sldId id="282" r:id="rId21"/>
+    <p:sldId id="296" r:id="rId5"/>
+    <p:sldId id="293" r:id="rId6"/>
+    <p:sldId id="294" r:id="rId7"/>
+    <p:sldId id="283" r:id="rId8"/>
+    <p:sldId id="284" r:id="rId9"/>
+    <p:sldId id="279" r:id="rId10"/>
+    <p:sldId id="280" r:id="rId11"/>
+    <p:sldId id="275" r:id="rId12"/>
+    <p:sldId id="285" r:id="rId13"/>
+    <p:sldId id="286" r:id="rId14"/>
+    <p:sldId id="287" r:id="rId15"/>
+    <p:sldId id="288" r:id="rId16"/>
+    <p:sldId id="289" r:id="rId17"/>
+    <p:sldId id="290" r:id="rId18"/>
+    <p:sldId id="291" r:id="rId19"/>
+    <p:sldId id="292" r:id="rId20"/>
+    <p:sldId id="295" r:id="rId21"/>
+    <p:sldId id="282" r:id="rId22"/>
   </p:sldIdLst>
   <p:sldSz cx="12192000" cy="6858000"/>
   <p:notesSz cx="6858000" cy="9144000"/>
@@ -141,6 +142,7 @@
           <p14:sldIdLst>
             <p14:sldId id="281"/>
             <p14:sldId id="271"/>
+            <p14:sldId id="296"/>
             <p14:sldId id="293"/>
             <p14:sldId id="294"/>
             <p14:sldId id="283"/>
@@ -870,7 +872,7 @@
           <a:p>
             <a:fld id="{DF61EA0F-A667-4B49-8422-0062BC55E249}" type="slidenum">
               <a:rPr lang="en-US" smtClean="0"/>
-              <a:t>20</a:t>
+              <a:t>21</a:t>
             </a:fld>
             <a:endParaRPr lang="en-US" dirty="0"/>
           </a:p>
@@ -2754,6 +2756,575 @@
       </p:grpSpPr>
       <p:sp>
         <p:nvSpPr>
+          <p:cNvPr id="3" name="Title 2"/>
+          <p:cNvSpPr>
+            <a:spLocks noGrp="1"/>
+          </p:cNvSpPr>
+          <p:nvPr>
+            <p:ph type="title"/>
+          </p:nvPr>
+        </p:nvSpPr>
+        <p:spPr/>
+        <p:txBody>
+          <a:bodyPr/>
+          <a:lstStyle/>
+          <a:p>
+            <a:r>
+              <a:rPr lang="en-US" dirty="0"/>
+              <a:t>SINGLE RESPONSIBILITY PRINCIPLE</a:t>
+            </a:r>
+            <a:endParaRPr lang="en-US" dirty="0">
+              <a:latin typeface="Segoe UI Light" panose="020B0502040204020203" pitchFamily="34" charset="0"/>
+              <a:cs typeface="Segoe UI Light" panose="020B0502040204020203" pitchFamily="34" charset="0"/>
+            </a:endParaRPr>
+          </a:p>
+        </p:txBody>
+      </p:sp>
+      <p:sp>
+        <p:nvSpPr>
+          <p:cNvPr id="31" name="Content Placeholder 17">
+            <a:extLst>
+              <a:ext uri="{FF2B5EF4-FFF2-40B4-BE49-F238E27FC236}">
+                <a16:creationId xmlns:a16="http://schemas.microsoft.com/office/drawing/2014/main" id="{ACECB700-9D9A-2026-DCE3-74DEC3C8D1B0}"/>
+              </a:ext>
+            </a:extLst>
+          </p:cNvPr>
+          <p:cNvSpPr txBox="1">
+            <a:spLocks/>
+          </p:cNvSpPr>
+          <p:nvPr/>
+        </p:nvSpPr>
+        <p:spPr>
+          <a:xfrm>
+            <a:off x="604344" y="1339746"/>
+            <a:ext cx="4806555" cy="5178500"/>
+          </a:xfrm>
+          <a:prstGeom prst="rect">
+            <a:avLst/>
+          </a:prstGeom>
+        </p:spPr>
+        <p:txBody>
+          <a:bodyPr vert="horz" lIns="91440" tIns="45720" rIns="91440" bIns="45720" rtlCol="0">
+            <a:normAutofit/>
+          </a:bodyPr>
+          <a:lstStyle>
+            <a:lvl1pPr marL="228600" indent="-228600" algn="l" defTabSz="914400" rtl="0" eaLnBrk="1" latinLnBrk="0" hangingPunct="1">
+              <a:lnSpc>
+                <a:spcPts val="1800"/>
+              </a:lnSpc>
+              <a:spcBef>
+                <a:spcPts val="1000"/>
+              </a:spcBef>
+              <a:spcAft>
+                <a:spcPts val="1000"/>
+              </a:spcAft>
+              <a:buFont typeface="Arial" panose="020B0604020202020204" pitchFamily="34" charset="0"/>
+              <a:buChar char="•"/>
+              <a:defRPr lang="en-US" sz="1200" kern="1200" smtClean="0">
+                <a:solidFill>
+                  <a:schemeClr val="tx1">
+                    <a:lumMod val="75000"/>
+                    <a:lumOff val="25000"/>
+                  </a:schemeClr>
+                </a:solidFill>
+                <a:latin typeface="+mn-lt"/>
+                <a:ea typeface="+mn-ea"/>
+                <a:cs typeface="+mn-cs"/>
+              </a:defRPr>
+            </a:lvl1pPr>
+            <a:lvl2pPr marL="685800" indent="-228600" algn="l" defTabSz="914400" rtl="0" eaLnBrk="1" latinLnBrk="0" hangingPunct="1">
+              <a:lnSpc>
+                <a:spcPts val="1800"/>
+              </a:lnSpc>
+              <a:spcBef>
+                <a:spcPts val="1000"/>
+              </a:spcBef>
+              <a:spcAft>
+                <a:spcPts val="1000"/>
+              </a:spcAft>
+              <a:buFont typeface="Arial" panose="020B0604020202020204" pitchFamily="34" charset="0"/>
+              <a:buChar char="•"/>
+              <a:defRPr lang="en-US" sz="1200" kern="1200" smtClean="0">
+                <a:solidFill>
+                  <a:schemeClr val="tx1">
+                    <a:lumMod val="75000"/>
+                    <a:lumOff val="25000"/>
+                  </a:schemeClr>
+                </a:solidFill>
+                <a:latin typeface="+mn-lt"/>
+                <a:ea typeface="+mn-ea"/>
+                <a:cs typeface="+mn-cs"/>
+              </a:defRPr>
+            </a:lvl2pPr>
+            <a:lvl3pPr marL="1143000" indent="-228600" algn="l" defTabSz="914400" rtl="0" eaLnBrk="1" latinLnBrk="0" hangingPunct="1">
+              <a:lnSpc>
+                <a:spcPts val="1800"/>
+              </a:lnSpc>
+              <a:spcBef>
+                <a:spcPts val="1000"/>
+              </a:spcBef>
+              <a:spcAft>
+                <a:spcPts val="1000"/>
+              </a:spcAft>
+              <a:buFont typeface="Arial" panose="020B0604020202020204" pitchFamily="34" charset="0"/>
+              <a:buChar char="•"/>
+              <a:defRPr lang="en-US" sz="1200" kern="1200" smtClean="0">
+                <a:solidFill>
+                  <a:schemeClr val="tx1">
+                    <a:lumMod val="75000"/>
+                    <a:lumOff val="25000"/>
+                  </a:schemeClr>
+                </a:solidFill>
+                <a:latin typeface="+mn-lt"/>
+                <a:ea typeface="+mn-ea"/>
+                <a:cs typeface="+mn-cs"/>
+              </a:defRPr>
+            </a:lvl3pPr>
+            <a:lvl4pPr marL="1600200" indent="-228600" algn="l" defTabSz="914400" rtl="0" eaLnBrk="1" latinLnBrk="0" hangingPunct="1">
+              <a:lnSpc>
+                <a:spcPts val="1800"/>
+              </a:lnSpc>
+              <a:spcBef>
+                <a:spcPts val="1000"/>
+              </a:spcBef>
+              <a:spcAft>
+                <a:spcPts val="1000"/>
+              </a:spcAft>
+              <a:buFont typeface="Arial" panose="020B0604020202020204" pitchFamily="34" charset="0"/>
+              <a:buChar char="•"/>
+              <a:defRPr lang="en-US" sz="1200" kern="1200" smtClean="0">
+                <a:solidFill>
+                  <a:schemeClr val="tx1">
+                    <a:lumMod val="75000"/>
+                    <a:lumOff val="25000"/>
+                  </a:schemeClr>
+                </a:solidFill>
+                <a:latin typeface="+mn-lt"/>
+                <a:ea typeface="+mn-ea"/>
+                <a:cs typeface="+mn-cs"/>
+              </a:defRPr>
+            </a:lvl4pPr>
+            <a:lvl5pPr marL="2057400" indent="-228600" algn="l" defTabSz="914400" rtl="0" eaLnBrk="1" latinLnBrk="0" hangingPunct="1">
+              <a:lnSpc>
+                <a:spcPts val="1800"/>
+              </a:lnSpc>
+              <a:spcBef>
+                <a:spcPts val="1000"/>
+              </a:spcBef>
+              <a:spcAft>
+                <a:spcPts val="1000"/>
+              </a:spcAft>
+              <a:buFont typeface="Arial" panose="020B0604020202020204" pitchFamily="34" charset="0"/>
+              <a:buChar char="•"/>
+              <a:defRPr lang="en-US" sz="1200" kern="1200">
+                <a:solidFill>
+                  <a:schemeClr val="tx1">
+                    <a:lumMod val="75000"/>
+                    <a:lumOff val="25000"/>
+                  </a:schemeClr>
+                </a:solidFill>
+                <a:latin typeface="+mn-lt"/>
+                <a:ea typeface="+mn-ea"/>
+                <a:cs typeface="+mn-cs"/>
+              </a:defRPr>
+            </a:lvl5pPr>
+            <a:lvl6pPr marL="2514600" indent="-228600" algn="l" defTabSz="914400" rtl="0" eaLnBrk="1" latinLnBrk="0" hangingPunct="1">
+              <a:lnSpc>
+                <a:spcPct val="90000"/>
+              </a:lnSpc>
+              <a:spcBef>
+                <a:spcPct val="30000"/>
+              </a:spcBef>
+              <a:buFont typeface="Arial" panose="020B0604020202020204" pitchFamily="34" charset="0"/>
+              <a:buChar char="•"/>
+              <a:defRPr sz="1800" kern="1200">
+                <a:solidFill>
+                  <a:schemeClr val="tx1"/>
+                </a:solidFill>
+                <a:latin typeface="+mn-lt"/>
+                <a:ea typeface="+mn-ea"/>
+                <a:cs typeface="+mn-cs"/>
+              </a:defRPr>
+            </a:lvl6pPr>
+            <a:lvl7pPr marL="2971800" indent="-228600" algn="l" defTabSz="914400" rtl="0" eaLnBrk="1" latinLnBrk="0" hangingPunct="1">
+              <a:lnSpc>
+                <a:spcPct val="90000"/>
+              </a:lnSpc>
+              <a:spcBef>
+                <a:spcPct val="30000"/>
+              </a:spcBef>
+              <a:buFont typeface="Arial" panose="020B0604020202020204" pitchFamily="34" charset="0"/>
+              <a:buChar char="•"/>
+              <a:defRPr sz="1800" kern="1200">
+                <a:solidFill>
+                  <a:schemeClr val="tx1"/>
+                </a:solidFill>
+                <a:latin typeface="+mn-lt"/>
+                <a:ea typeface="+mn-ea"/>
+                <a:cs typeface="+mn-cs"/>
+              </a:defRPr>
+            </a:lvl7pPr>
+            <a:lvl8pPr marL="3429000" indent="-228600" algn="l" defTabSz="914400" rtl="0" eaLnBrk="1" latinLnBrk="0" hangingPunct="1">
+              <a:lnSpc>
+                <a:spcPct val="90000"/>
+              </a:lnSpc>
+              <a:spcBef>
+                <a:spcPct val="30000"/>
+              </a:spcBef>
+              <a:buFont typeface="Arial" panose="020B0604020202020204" pitchFamily="34" charset="0"/>
+              <a:buChar char="•"/>
+              <a:defRPr sz="1800" kern="1200">
+                <a:solidFill>
+                  <a:schemeClr val="tx1"/>
+                </a:solidFill>
+                <a:latin typeface="+mn-lt"/>
+                <a:ea typeface="+mn-ea"/>
+                <a:cs typeface="+mn-cs"/>
+              </a:defRPr>
+            </a:lvl8pPr>
+            <a:lvl9pPr marL="3886200" indent="-228600" algn="l" defTabSz="914400" rtl="0" eaLnBrk="1" latinLnBrk="0" hangingPunct="1">
+              <a:lnSpc>
+                <a:spcPct val="90000"/>
+              </a:lnSpc>
+              <a:spcBef>
+                <a:spcPct val="30000"/>
+              </a:spcBef>
+              <a:buFont typeface="Arial" panose="020B0604020202020204" pitchFamily="34" charset="0"/>
+              <a:buChar char="•"/>
+              <a:defRPr sz="1800" kern="1200">
+                <a:solidFill>
+                  <a:schemeClr val="tx1"/>
+                </a:solidFill>
+                <a:latin typeface="+mn-lt"/>
+                <a:ea typeface="+mn-ea"/>
+                <a:cs typeface="+mn-cs"/>
+              </a:defRPr>
+            </a:lvl9pPr>
+          </a:lstStyle>
+          <a:p>
+            <a:pPr marL="0" lvl="0" indent="0">
+              <a:spcAft>
+                <a:spcPts val="600"/>
+              </a:spcAft>
+              <a:buNone/>
+              <a:defRPr/>
+            </a:pPr>
+            <a:r>
+              <a:rPr lang="en-US" sz="1100" dirty="0">
+                <a:latin typeface="Segoe UI" panose="020B0502040204020203" pitchFamily="34" charset="0"/>
+                <a:cs typeface="Segoe UI" panose="020B0502040204020203" pitchFamily="34" charset="0"/>
+              </a:rPr>
+              <a:t>A class (or method) should only have one responsibility hence only one reason to change.</a:t>
+            </a:r>
+          </a:p>
+          <a:p>
+            <a:pPr marL="0" lvl="0" indent="0">
+              <a:spcAft>
+                <a:spcPts val="600"/>
+              </a:spcAft>
+              <a:buNone/>
+              <a:defRPr/>
+            </a:pPr>
+            <a:r>
+              <a:rPr lang="en-US" sz="1100" dirty="0">
+                <a:solidFill>
+                  <a:schemeClr val="accent4"/>
+                </a:solidFill>
+                <a:latin typeface="Segoe UI" panose="020B0502040204020203" pitchFamily="34" charset="0"/>
+                <a:cs typeface="Segoe UI" panose="020B0502040204020203" pitchFamily="34" charset="0"/>
+              </a:rPr>
+              <a:t>Misinterpretation</a:t>
+            </a:r>
+            <a:r>
+              <a:rPr lang="en-US" sz="1100" dirty="0">
+                <a:latin typeface="Segoe UI" panose="020B0502040204020203" pitchFamily="34" charset="0"/>
+                <a:cs typeface="Segoe UI" panose="020B0502040204020203" pitchFamily="34" charset="0"/>
+              </a:rPr>
+              <a:t> – Most developers interpret to mean that a class should perform only one task. But it's not only classes, functions you implement in code during development should also perform only one task. So one should interpret it as meaning that an implementation should perform only one task.</a:t>
+            </a:r>
+          </a:p>
+          <a:p>
+            <a:pPr marL="0" lvl="0" indent="0">
+              <a:spcAft>
+                <a:spcPts val="600"/>
+              </a:spcAft>
+              <a:buNone/>
+              <a:defRPr/>
+            </a:pPr>
+            <a:r>
+              <a:rPr lang="en-US" sz="1100" dirty="0">
+                <a:solidFill>
+                  <a:schemeClr val="accent4"/>
+                </a:solidFill>
+                <a:latin typeface="Segoe UI" panose="020B0502040204020203" pitchFamily="34" charset="0"/>
+                <a:cs typeface="Segoe UI" panose="020B0502040204020203" pitchFamily="34" charset="0"/>
+              </a:rPr>
+              <a:t>Benefits</a:t>
+            </a:r>
+            <a:r>
+              <a:rPr lang="en-US" sz="1100" dirty="0">
+                <a:latin typeface="Segoe UI" panose="020B0502040204020203" pitchFamily="34" charset="0"/>
+                <a:cs typeface="Segoe UI" panose="020B0502040204020203" pitchFamily="34" charset="0"/>
+              </a:rPr>
+              <a:t>:</a:t>
+            </a:r>
+          </a:p>
+          <a:p>
+            <a:pPr>
+              <a:spcAft>
+                <a:spcPts val="600"/>
+              </a:spcAft>
+              <a:defRPr/>
+            </a:pPr>
+            <a:r>
+              <a:rPr lang="en-US" sz="1100" dirty="0">
+                <a:latin typeface="Segoe UI" panose="020B0502040204020203" pitchFamily="34" charset="0"/>
+                <a:cs typeface="Segoe UI" panose="020B0502040204020203" pitchFamily="34" charset="0"/>
+              </a:rPr>
+              <a:t>Easier to understand for a new teammate.</a:t>
+            </a:r>
+          </a:p>
+          <a:p>
+            <a:pPr>
+              <a:spcAft>
+                <a:spcPts val="600"/>
+              </a:spcAft>
+              <a:defRPr/>
+            </a:pPr>
+            <a:r>
+              <a:rPr lang="en-US" sz="1100" dirty="0">
+                <a:latin typeface="Segoe UI" panose="020B0502040204020203" pitchFamily="34" charset="0"/>
+                <a:cs typeface="Segoe UI" panose="020B0502040204020203" pitchFamily="34" charset="0"/>
+              </a:rPr>
+              <a:t>Maintain is easy as it change less frequently.</a:t>
+            </a:r>
+          </a:p>
+          <a:p>
+            <a:pPr>
+              <a:spcAft>
+                <a:spcPts val="600"/>
+              </a:spcAft>
+              <a:defRPr/>
+            </a:pPr>
+            <a:r>
+              <a:rPr lang="en-US" sz="1100" dirty="0">
+                <a:latin typeface="Segoe UI" panose="020B0502040204020203" pitchFamily="34" charset="0"/>
+                <a:cs typeface="Segoe UI" panose="020B0502040204020203" pitchFamily="34" charset="0"/>
+              </a:rPr>
+              <a:t>Easier to Test</a:t>
+            </a:r>
+          </a:p>
+          <a:p>
+            <a:pPr marL="0" indent="0">
+              <a:spcAft>
+                <a:spcPts val="600"/>
+              </a:spcAft>
+              <a:buNone/>
+              <a:defRPr/>
+            </a:pPr>
+            <a:r>
+              <a:rPr lang="en-US" sz="1100" dirty="0">
+                <a:solidFill>
+                  <a:schemeClr val="accent4"/>
+                </a:solidFill>
+                <a:latin typeface="Segoe UI" panose="020B0502040204020203" pitchFamily="34" charset="0"/>
+                <a:cs typeface="Segoe UI" panose="020B0502040204020203" pitchFamily="34" charset="0"/>
+              </a:rPr>
+              <a:t>How to determine?</a:t>
+            </a:r>
+          </a:p>
+          <a:p>
+            <a:pPr>
+              <a:spcAft>
+                <a:spcPts val="600"/>
+              </a:spcAft>
+              <a:defRPr/>
+            </a:pPr>
+            <a:r>
+              <a:rPr lang="en-US" sz="1100" dirty="0">
+                <a:solidFill>
+                  <a:schemeClr val="tx1"/>
+                </a:solidFill>
+                <a:latin typeface="Segoe UI" panose="020B0502040204020203" pitchFamily="34" charset="0"/>
+                <a:cs typeface="Segoe UI" panose="020B0502040204020203" pitchFamily="34" charset="0"/>
+              </a:rPr>
+              <a:t>Class description should not contain words like “And , Or, But or If”.</a:t>
+            </a:r>
+          </a:p>
+          <a:p>
+            <a:pPr>
+              <a:spcAft>
+                <a:spcPts val="600"/>
+              </a:spcAft>
+              <a:defRPr/>
+            </a:pPr>
+            <a:r>
+              <a:rPr lang="en-US" sz="1100" dirty="0">
+                <a:solidFill>
+                  <a:schemeClr val="tx1"/>
+                </a:solidFill>
+                <a:latin typeface="Segoe UI" panose="020B0502040204020203" pitchFamily="34" charset="0"/>
+                <a:cs typeface="Segoe UI" panose="020B0502040204020203" pitchFamily="34" charset="0"/>
+              </a:rPr>
+              <a:t>Class constructor/method contains too many parameters.</a:t>
+            </a:r>
+          </a:p>
+          <a:p>
+            <a:pPr>
+              <a:spcAft>
+                <a:spcPts val="600"/>
+              </a:spcAft>
+              <a:defRPr/>
+            </a:pPr>
+            <a:endParaRPr lang="en-US" sz="1100" dirty="0">
+              <a:solidFill>
+                <a:schemeClr val="tx1"/>
+              </a:solidFill>
+              <a:latin typeface="Segoe UI" panose="020B0502040204020203" pitchFamily="34" charset="0"/>
+              <a:cs typeface="Segoe UI" panose="020B0502040204020203" pitchFamily="34" charset="0"/>
+            </a:endParaRPr>
+          </a:p>
+          <a:p>
+            <a:pPr marL="0" lvl="0" indent="0">
+              <a:spcAft>
+                <a:spcPts val="600"/>
+              </a:spcAft>
+              <a:buNone/>
+              <a:defRPr/>
+            </a:pPr>
+            <a:endParaRPr lang="en-US" sz="1100" dirty="0">
+              <a:latin typeface="Segoe UI" panose="020B0502040204020203" pitchFamily="34" charset="0"/>
+              <a:cs typeface="Segoe UI" panose="020B0502040204020203" pitchFamily="34" charset="0"/>
+            </a:endParaRPr>
+          </a:p>
+        </p:txBody>
+      </p:sp>
+      <p:pic>
+        <p:nvPicPr>
+          <p:cNvPr id="4100" name="Picture 4" descr="largest victorinox swiss army knife Offers online OFF 61%">
+            <a:extLst>
+              <a:ext uri="{FF2B5EF4-FFF2-40B4-BE49-F238E27FC236}">
+                <a16:creationId xmlns:a16="http://schemas.microsoft.com/office/drawing/2014/main" id="{5D6F8893-F919-A1F7-F768-1053CB906DFB}"/>
+              </a:ext>
+            </a:extLst>
+          </p:cNvPr>
+          <p:cNvPicPr>
+            <a:picLocks noChangeAspect="1" noChangeArrowheads="1"/>
+          </p:cNvPicPr>
+          <p:nvPr/>
+        </p:nvPicPr>
+        <p:blipFill>
+          <a:blip r:embed="rId2">
+            <a:extLst>
+              <a:ext uri="{28A0092B-C50C-407E-A947-70E740481C1C}">
+                <a14:useLocalDpi xmlns:a14="http://schemas.microsoft.com/office/drawing/2010/main" val="0"/>
+              </a:ext>
+            </a:extLst>
+          </a:blip>
+          <a:srcRect/>
+          <a:stretch>
+            <a:fillRect/>
+          </a:stretch>
+        </p:blipFill>
+        <p:spPr bwMode="auto">
+          <a:xfrm>
+            <a:off x="6371208" y="1238745"/>
+            <a:ext cx="3225553" cy="2272222"/>
+          </a:xfrm>
+          <a:prstGeom prst="rect">
+            <a:avLst/>
+          </a:prstGeom>
+          <a:noFill/>
+          <a:extLst>
+            <a:ext uri="{909E8E84-426E-40DD-AFC4-6F175D3DCCD1}">
+              <a14:hiddenFill xmlns:a14="http://schemas.microsoft.com/office/drawing/2010/main">
+                <a:solidFill>
+                  <a:srgbClr val="FFFFFF"/>
+                </a:solidFill>
+              </a14:hiddenFill>
+            </a:ext>
+          </a:extLst>
+        </p:spPr>
+      </p:pic>
+      <p:pic>
+        <p:nvPicPr>
+          <p:cNvPr id="1026" name="Picture 2">
+            <a:extLst>
+              <a:ext uri="{FF2B5EF4-FFF2-40B4-BE49-F238E27FC236}">
+                <a16:creationId xmlns:a16="http://schemas.microsoft.com/office/drawing/2014/main" id="{125660DA-606B-3A84-0AA4-3B729DBB1A06}"/>
+              </a:ext>
+            </a:extLst>
+          </p:cNvPr>
+          <p:cNvPicPr>
+            <a:picLocks noChangeAspect="1" noChangeArrowheads="1"/>
+          </p:cNvPicPr>
+          <p:nvPr/>
+        </p:nvPicPr>
+        <p:blipFill>
+          <a:blip r:embed="rId3">
+            <a:extLst>
+              <a:ext uri="{28A0092B-C50C-407E-A947-70E740481C1C}">
+                <a14:useLocalDpi xmlns:a14="http://schemas.microsoft.com/office/drawing/2010/main" val="0"/>
+              </a:ext>
+            </a:extLst>
+          </a:blip>
+          <a:srcRect/>
+          <a:stretch>
+            <a:fillRect/>
+          </a:stretch>
+        </p:blipFill>
+        <p:spPr bwMode="auto">
+          <a:xfrm>
+            <a:off x="6433352" y="3661577"/>
+            <a:ext cx="4290874" cy="2646039"/>
+          </a:xfrm>
+          <a:prstGeom prst="rect">
+            <a:avLst/>
+          </a:prstGeom>
+          <a:noFill/>
+          <a:extLst>
+            <a:ext uri="{909E8E84-426E-40DD-AFC4-6F175D3DCCD1}">
+              <a14:hiddenFill xmlns:a14="http://schemas.microsoft.com/office/drawing/2010/main">
+                <a:solidFill>
+                  <a:srgbClr val="FFFFFF"/>
+                </a:solidFill>
+              </a14:hiddenFill>
+            </a:ext>
+          </a:extLst>
+        </p:spPr>
+      </p:pic>
+    </p:spTree>
+    <p:extLst>
+      <p:ext uri="{BB962C8B-B14F-4D97-AF65-F5344CB8AC3E}">
+        <p14:creationId xmlns:p14="http://schemas.microsoft.com/office/powerpoint/2010/main" val="2596833607"/>
+      </p:ext>
+    </p:extLst>
+  </p:cSld>
+  <p:clrMapOvr>
+    <a:masterClrMapping/>
+  </p:clrMapOvr>
+</p:sld>
+</file>
+
+<file path=ppt/slides/slide11.xml><?xml version="1.0" encoding="utf-8"?>
+<p:sld xmlns:a="http://schemas.openxmlformats.org/drawingml/2006/main" xmlns:r="http://schemas.openxmlformats.org/officeDocument/2006/relationships" xmlns:p="http://schemas.openxmlformats.org/presentationml/2006/main">
+  <p:cSld>
+    <p:spTree>
+      <p:nvGrpSpPr>
+        <p:cNvPr id="1" name=""/>
+        <p:cNvGrpSpPr/>
+        <p:nvPr/>
+      </p:nvGrpSpPr>
+      <p:grpSpPr>
+        <a:xfrm>
+          <a:off x="0" y="0"/>
+          <a:ext cx="0" cy="0"/>
+          <a:chOff x="0" y="0"/>
+          <a:chExt cx="0" cy="0"/>
+        </a:xfrm>
+      </p:grpSpPr>
+      <p:sp>
+        <p:nvSpPr>
           <p:cNvPr id="6" name="Title 5"/>
           <p:cNvSpPr>
             <a:spLocks noGrp="1"/>
@@ -2798,7 +3369,7 @@
           <a:effectLst/>
           <a:extLst>
             <a:ext uri="{C572A759-6A51-4108-AA02-DFA0A04FC94B}">
-              <ma14:wrappingTextBoxFlag xmlns:ma14="http://schemas.microsoft.com/office/mac/drawingml/2011/main" xmlns=""/>
+              <ma14:wrappingTextBoxFlag xmlns="" xmlns:ma14="http://schemas.microsoft.com/office/mac/drawingml/2011/main"/>
             </a:ext>
           </a:extLst>
         </p:spPr>
@@ -2928,7 +3499,7 @@
 </p:sld>
 </file>
 
-<file path=ppt/slides/slide11.xml><?xml version="1.0" encoding="utf-8"?>
+<file path=ppt/slides/slide12.xml><?xml version="1.0" encoding="utf-8"?>
 <p:sld xmlns:a="http://schemas.openxmlformats.org/drawingml/2006/main" xmlns:r="http://schemas.openxmlformats.org/officeDocument/2006/relationships" xmlns:p="http://schemas.openxmlformats.org/presentationml/2006/main">
   <p:cSld>
     <p:spTree>
@@ -3502,7 +4073,7 @@
 </p:sld>
 </file>
 
-<file path=ppt/slides/slide12.xml><?xml version="1.0" encoding="utf-8"?>
+<file path=ppt/slides/slide13.xml><?xml version="1.0" encoding="utf-8"?>
 <p:sld xmlns:a="http://schemas.openxmlformats.org/drawingml/2006/main" xmlns:r="http://schemas.openxmlformats.org/officeDocument/2006/relationships" xmlns:p="http://schemas.openxmlformats.org/presentationml/2006/main">
   <p:cSld>
     <p:spTree>
@@ -3565,7 +4136,7 @@
           <a:effectLst/>
           <a:extLst>
             <a:ext uri="{C572A759-6A51-4108-AA02-DFA0A04FC94B}">
-              <ma14:wrappingTextBoxFlag xmlns:ma14="http://schemas.microsoft.com/office/mac/drawingml/2011/main" xmlns=""/>
+              <ma14:wrappingTextBoxFlag xmlns="" xmlns:ma14="http://schemas.microsoft.com/office/mac/drawingml/2011/main"/>
             </a:ext>
           </a:extLst>
         </p:spPr>
@@ -3695,7 +4266,7 @@
 </p:sld>
 </file>
 
-<file path=ppt/slides/slide13.xml><?xml version="1.0" encoding="utf-8"?>
+<file path=ppt/slides/slide14.xml><?xml version="1.0" encoding="utf-8"?>
 <p:sld xmlns:a="http://schemas.openxmlformats.org/drawingml/2006/main" xmlns:r="http://schemas.openxmlformats.org/officeDocument/2006/relationships" xmlns:p="http://schemas.openxmlformats.org/presentationml/2006/main">
   <p:cSld>
     <p:spTree>
@@ -4408,7 +4979,7 @@
 </p:sld>
 </file>
 
-<file path=ppt/slides/slide14.xml><?xml version="1.0" encoding="utf-8"?>
+<file path=ppt/slides/slide15.xml><?xml version="1.0" encoding="utf-8"?>
 <p:sld xmlns:a="http://schemas.openxmlformats.org/drawingml/2006/main" xmlns:r="http://schemas.openxmlformats.org/officeDocument/2006/relationships" xmlns:p="http://schemas.openxmlformats.org/presentationml/2006/main">
   <p:cSld>
     <p:spTree>
@@ -4471,7 +5042,7 @@
           <a:effectLst/>
           <a:extLst>
             <a:ext uri="{C572A759-6A51-4108-AA02-DFA0A04FC94B}">
-              <ma14:wrappingTextBoxFlag xmlns:ma14="http://schemas.microsoft.com/office/mac/drawingml/2011/main" xmlns=""/>
+              <ma14:wrappingTextBoxFlag xmlns="" xmlns:ma14="http://schemas.microsoft.com/office/mac/drawingml/2011/main"/>
             </a:ext>
           </a:extLst>
         </p:spPr>
@@ -4601,7 +5172,7 @@
 </p:sld>
 </file>
 
-<file path=ppt/slides/slide15.xml><?xml version="1.0" encoding="utf-8"?>
+<file path=ppt/slides/slide16.xml><?xml version="1.0" encoding="utf-8"?>
 <p:sld xmlns:a="http://schemas.openxmlformats.org/drawingml/2006/main" xmlns:r="http://schemas.openxmlformats.org/officeDocument/2006/relationships" xmlns:p="http://schemas.openxmlformats.org/presentationml/2006/main">
   <p:cSld>
     <p:spTree>
@@ -5171,7 +5742,7 @@
 </p:sld>
 </file>
 
-<file path=ppt/slides/slide16.xml><?xml version="1.0" encoding="utf-8"?>
+<file path=ppt/slides/slide17.xml><?xml version="1.0" encoding="utf-8"?>
 <p:sld xmlns:a="http://schemas.openxmlformats.org/drawingml/2006/main" xmlns:r="http://schemas.openxmlformats.org/officeDocument/2006/relationships" xmlns:p="http://schemas.openxmlformats.org/presentationml/2006/main">
   <p:cSld>
     <p:spTree>
@@ -5234,7 +5805,7 @@
           <a:effectLst/>
           <a:extLst>
             <a:ext uri="{C572A759-6A51-4108-AA02-DFA0A04FC94B}">
-              <ma14:wrappingTextBoxFlag xmlns:ma14="http://schemas.microsoft.com/office/mac/drawingml/2011/main" xmlns=""/>
+              <ma14:wrappingTextBoxFlag xmlns="" xmlns:ma14="http://schemas.microsoft.com/office/mac/drawingml/2011/main"/>
             </a:ext>
           </a:extLst>
         </p:spPr>
@@ -5364,7 +5935,7 @@
 </p:sld>
 </file>
 
-<file path=ppt/slides/slide17.xml><?xml version="1.0" encoding="utf-8"?>
+<file path=ppt/slides/slide18.xml><?xml version="1.0" encoding="utf-8"?>
 <p:sld xmlns:a="http://schemas.openxmlformats.org/drawingml/2006/main" xmlns:r="http://schemas.openxmlformats.org/officeDocument/2006/relationships" xmlns:p="http://schemas.openxmlformats.org/presentationml/2006/main">
   <p:cSld>
     <p:spTree>
@@ -5964,7 +6535,7 @@
 </p:sld>
 </file>
 
-<file path=ppt/slides/slide18.xml><?xml version="1.0" encoding="utf-8"?>
+<file path=ppt/slides/slide19.xml><?xml version="1.0" encoding="utf-8"?>
 <p:sld xmlns:a="http://schemas.openxmlformats.org/drawingml/2006/main" xmlns:r="http://schemas.openxmlformats.org/officeDocument/2006/relationships" xmlns:p="http://schemas.openxmlformats.org/presentationml/2006/main">
   <p:cSld>
     <p:spTree>
@@ -6027,7 +6598,7 @@
           <a:effectLst/>
           <a:extLst>
             <a:ext uri="{C572A759-6A51-4108-AA02-DFA0A04FC94B}">
-              <ma14:wrappingTextBoxFlag xmlns:ma14="http://schemas.microsoft.com/office/mac/drawingml/2011/main" xmlns=""/>
+              <ma14:wrappingTextBoxFlag xmlns="" xmlns:ma14="http://schemas.microsoft.com/office/mac/drawingml/2011/main"/>
             </a:ext>
           </a:extLst>
         </p:spPr>
@@ -6319,436 +6890,6 @@
 </p:sld>
 </file>
 
-<file path=ppt/slides/slide19.xml><?xml version="1.0" encoding="utf-8"?>
-<p:sld xmlns:a="http://schemas.openxmlformats.org/drawingml/2006/main" xmlns:r="http://schemas.openxmlformats.org/officeDocument/2006/relationships" xmlns:p="http://schemas.openxmlformats.org/presentationml/2006/main">
-  <p:cSld>
-    <p:spTree>
-      <p:nvGrpSpPr>
-        <p:cNvPr id="1" name=""/>
-        <p:cNvGrpSpPr/>
-        <p:nvPr/>
-      </p:nvGrpSpPr>
-      <p:grpSpPr>
-        <a:xfrm>
-          <a:off x="0" y="0"/>
-          <a:ext cx="0" cy="0"/>
-          <a:chOff x="0" y="0"/>
-          <a:chExt cx="0" cy="0"/>
-        </a:xfrm>
-      </p:grpSpPr>
-      <p:sp>
-        <p:nvSpPr>
-          <p:cNvPr id="3" name="Title 2"/>
-          <p:cNvSpPr>
-            <a:spLocks noGrp="1"/>
-          </p:cNvSpPr>
-          <p:nvPr>
-            <p:ph type="title"/>
-          </p:nvPr>
-        </p:nvSpPr>
-        <p:spPr/>
-        <p:txBody>
-          <a:bodyPr/>
-          <a:lstStyle/>
-          <a:p>
-            <a:r>
-              <a:rPr lang="en-US" dirty="0"/>
-              <a:t>DEPENDENCY INJECTION</a:t>
-            </a:r>
-          </a:p>
-        </p:txBody>
-      </p:sp>
-      <p:sp>
-        <p:nvSpPr>
-          <p:cNvPr id="8" name="Content Placeholder 17">
-            <a:extLst>
-              <a:ext uri="{FF2B5EF4-FFF2-40B4-BE49-F238E27FC236}">
-                <a16:creationId xmlns:a16="http://schemas.microsoft.com/office/drawing/2014/main" id="{1F093688-A3DE-DD89-3E93-93F8C8A28A12}"/>
-              </a:ext>
-            </a:extLst>
-          </p:cNvPr>
-          <p:cNvSpPr txBox="1">
-            <a:spLocks/>
-          </p:cNvSpPr>
-          <p:nvPr/>
-        </p:nvSpPr>
-        <p:spPr>
-          <a:xfrm>
-            <a:off x="604345" y="1339746"/>
-            <a:ext cx="4615726" cy="5178500"/>
-          </a:xfrm>
-          <a:prstGeom prst="rect">
-            <a:avLst/>
-          </a:prstGeom>
-        </p:spPr>
-        <p:txBody>
-          <a:bodyPr vert="horz" lIns="91440" tIns="45720" rIns="91440" bIns="45720" rtlCol="0">
-            <a:normAutofit/>
-          </a:bodyPr>
-          <a:lstStyle>
-            <a:lvl1pPr marL="228600" indent="-228600" algn="l" defTabSz="914400" rtl="0" eaLnBrk="1" latinLnBrk="0" hangingPunct="1">
-              <a:lnSpc>
-                <a:spcPts val="1800"/>
-              </a:lnSpc>
-              <a:spcBef>
-                <a:spcPts val="1000"/>
-              </a:spcBef>
-              <a:spcAft>
-                <a:spcPts val="1000"/>
-              </a:spcAft>
-              <a:buFont typeface="Arial" panose="020B0604020202020204" pitchFamily="34" charset="0"/>
-              <a:buChar char="•"/>
-              <a:defRPr lang="en-US" sz="1200" kern="1200" smtClean="0">
-                <a:solidFill>
-                  <a:schemeClr val="tx1">
-                    <a:lumMod val="75000"/>
-                    <a:lumOff val="25000"/>
-                  </a:schemeClr>
-                </a:solidFill>
-                <a:latin typeface="+mn-lt"/>
-                <a:ea typeface="+mn-ea"/>
-                <a:cs typeface="+mn-cs"/>
-              </a:defRPr>
-            </a:lvl1pPr>
-            <a:lvl2pPr marL="685800" indent="-228600" algn="l" defTabSz="914400" rtl="0" eaLnBrk="1" latinLnBrk="0" hangingPunct="1">
-              <a:lnSpc>
-                <a:spcPts val="1800"/>
-              </a:lnSpc>
-              <a:spcBef>
-                <a:spcPts val="1000"/>
-              </a:spcBef>
-              <a:spcAft>
-                <a:spcPts val="1000"/>
-              </a:spcAft>
-              <a:buFont typeface="Arial" panose="020B0604020202020204" pitchFamily="34" charset="0"/>
-              <a:buChar char="•"/>
-              <a:defRPr lang="en-US" sz="1200" kern="1200" smtClean="0">
-                <a:solidFill>
-                  <a:schemeClr val="tx1">
-                    <a:lumMod val="75000"/>
-                    <a:lumOff val="25000"/>
-                  </a:schemeClr>
-                </a:solidFill>
-                <a:latin typeface="+mn-lt"/>
-                <a:ea typeface="+mn-ea"/>
-                <a:cs typeface="+mn-cs"/>
-              </a:defRPr>
-            </a:lvl2pPr>
-            <a:lvl3pPr marL="1143000" indent="-228600" algn="l" defTabSz="914400" rtl="0" eaLnBrk="1" latinLnBrk="0" hangingPunct="1">
-              <a:lnSpc>
-                <a:spcPts val="1800"/>
-              </a:lnSpc>
-              <a:spcBef>
-                <a:spcPts val="1000"/>
-              </a:spcBef>
-              <a:spcAft>
-                <a:spcPts val="1000"/>
-              </a:spcAft>
-              <a:buFont typeface="Arial" panose="020B0604020202020204" pitchFamily="34" charset="0"/>
-              <a:buChar char="•"/>
-              <a:defRPr lang="en-US" sz="1200" kern="1200" smtClean="0">
-                <a:solidFill>
-                  <a:schemeClr val="tx1">
-                    <a:lumMod val="75000"/>
-                    <a:lumOff val="25000"/>
-                  </a:schemeClr>
-                </a:solidFill>
-                <a:latin typeface="+mn-lt"/>
-                <a:ea typeface="+mn-ea"/>
-                <a:cs typeface="+mn-cs"/>
-              </a:defRPr>
-            </a:lvl3pPr>
-            <a:lvl4pPr marL="1600200" indent="-228600" algn="l" defTabSz="914400" rtl="0" eaLnBrk="1" latinLnBrk="0" hangingPunct="1">
-              <a:lnSpc>
-                <a:spcPts val="1800"/>
-              </a:lnSpc>
-              <a:spcBef>
-                <a:spcPts val="1000"/>
-              </a:spcBef>
-              <a:spcAft>
-                <a:spcPts val="1000"/>
-              </a:spcAft>
-              <a:buFont typeface="Arial" panose="020B0604020202020204" pitchFamily="34" charset="0"/>
-              <a:buChar char="•"/>
-              <a:defRPr lang="en-US" sz="1200" kern="1200" smtClean="0">
-                <a:solidFill>
-                  <a:schemeClr val="tx1">
-                    <a:lumMod val="75000"/>
-                    <a:lumOff val="25000"/>
-                  </a:schemeClr>
-                </a:solidFill>
-                <a:latin typeface="+mn-lt"/>
-                <a:ea typeface="+mn-ea"/>
-                <a:cs typeface="+mn-cs"/>
-              </a:defRPr>
-            </a:lvl4pPr>
-            <a:lvl5pPr marL="2057400" indent="-228600" algn="l" defTabSz="914400" rtl="0" eaLnBrk="1" latinLnBrk="0" hangingPunct="1">
-              <a:lnSpc>
-                <a:spcPts val="1800"/>
-              </a:lnSpc>
-              <a:spcBef>
-                <a:spcPts val="1000"/>
-              </a:spcBef>
-              <a:spcAft>
-                <a:spcPts val="1000"/>
-              </a:spcAft>
-              <a:buFont typeface="Arial" panose="020B0604020202020204" pitchFamily="34" charset="0"/>
-              <a:buChar char="•"/>
-              <a:defRPr lang="en-US" sz="1200" kern="1200">
-                <a:solidFill>
-                  <a:schemeClr val="tx1">
-                    <a:lumMod val="75000"/>
-                    <a:lumOff val="25000"/>
-                  </a:schemeClr>
-                </a:solidFill>
-                <a:latin typeface="+mn-lt"/>
-                <a:ea typeface="+mn-ea"/>
-                <a:cs typeface="+mn-cs"/>
-              </a:defRPr>
-            </a:lvl5pPr>
-            <a:lvl6pPr marL="2514600" indent="-228600" algn="l" defTabSz="914400" rtl="0" eaLnBrk="1" latinLnBrk="0" hangingPunct="1">
-              <a:lnSpc>
-                <a:spcPct val="90000"/>
-              </a:lnSpc>
-              <a:spcBef>
-                <a:spcPct val="30000"/>
-              </a:spcBef>
-              <a:buFont typeface="Arial" panose="020B0604020202020204" pitchFamily="34" charset="0"/>
-              <a:buChar char="•"/>
-              <a:defRPr sz="1800" kern="1200">
-                <a:solidFill>
-                  <a:schemeClr val="tx1"/>
-                </a:solidFill>
-                <a:latin typeface="+mn-lt"/>
-                <a:ea typeface="+mn-ea"/>
-                <a:cs typeface="+mn-cs"/>
-              </a:defRPr>
-            </a:lvl6pPr>
-            <a:lvl7pPr marL="2971800" indent="-228600" algn="l" defTabSz="914400" rtl="0" eaLnBrk="1" latinLnBrk="0" hangingPunct="1">
-              <a:lnSpc>
-                <a:spcPct val="90000"/>
-              </a:lnSpc>
-              <a:spcBef>
-                <a:spcPct val="30000"/>
-              </a:spcBef>
-              <a:buFont typeface="Arial" panose="020B0604020202020204" pitchFamily="34" charset="0"/>
-              <a:buChar char="•"/>
-              <a:defRPr sz="1800" kern="1200">
-                <a:solidFill>
-                  <a:schemeClr val="tx1"/>
-                </a:solidFill>
-                <a:latin typeface="+mn-lt"/>
-                <a:ea typeface="+mn-ea"/>
-                <a:cs typeface="+mn-cs"/>
-              </a:defRPr>
-            </a:lvl7pPr>
-            <a:lvl8pPr marL="3429000" indent="-228600" algn="l" defTabSz="914400" rtl="0" eaLnBrk="1" latinLnBrk="0" hangingPunct="1">
-              <a:lnSpc>
-                <a:spcPct val="90000"/>
-              </a:lnSpc>
-              <a:spcBef>
-                <a:spcPct val="30000"/>
-              </a:spcBef>
-              <a:buFont typeface="Arial" panose="020B0604020202020204" pitchFamily="34" charset="0"/>
-              <a:buChar char="•"/>
-              <a:defRPr sz="1800" kern="1200">
-                <a:solidFill>
-                  <a:schemeClr val="tx1"/>
-                </a:solidFill>
-                <a:latin typeface="+mn-lt"/>
-                <a:ea typeface="+mn-ea"/>
-                <a:cs typeface="+mn-cs"/>
-              </a:defRPr>
-            </a:lvl8pPr>
-            <a:lvl9pPr marL="3886200" indent="-228600" algn="l" defTabSz="914400" rtl="0" eaLnBrk="1" latinLnBrk="0" hangingPunct="1">
-              <a:lnSpc>
-                <a:spcPct val="90000"/>
-              </a:lnSpc>
-              <a:spcBef>
-                <a:spcPct val="30000"/>
-              </a:spcBef>
-              <a:buFont typeface="Arial" panose="020B0604020202020204" pitchFamily="34" charset="0"/>
-              <a:buChar char="•"/>
-              <a:defRPr sz="1800" kern="1200">
-                <a:solidFill>
-                  <a:schemeClr val="tx1"/>
-                </a:solidFill>
-                <a:latin typeface="+mn-lt"/>
-                <a:ea typeface="+mn-ea"/>
-                <a:cs typeface="+mn-cs"/>
-              </a:defRPr>
-            </a:lvl9pPr>
-          </a:lstStyle>
-          <a:p>
-            <a:pPr marL="0" indent="0">
-              <a:spcAft>
-                <a:spcPts val="600"/>
-              </a:spcAft>
-              <a:buNone/>
-              <a:defRPr/>
-            </a:pPr>
-            <a:r>
-              <a:rPr lang="en-US" sz="1100" dirty="0">
-                <a:solidFill>
-                  <a:schemeClr val="tx1"/>
-                </a:solidFill>
-                <a:latin typeface="Segoe UI" panose="020B0502040204020203" pitchFamily="34" charset="0"/>
-                <a:cs typeface="Segoe UI" panose="020B0502040204020203" pitchFamily="34" charset="0"/>
-              </a:rPr>
-              <a:t>It is a pattern of injecting a class’s dependencies into it at runtime.</a:t>
-            </a:r>
-          </a:p>
-          <a:p>
-            <a:pPr>
-              <a:spcAft>
-                <a:spcPts val="600"/>
-              </a:spcAft>
-              <a:defRPr/>
-            </a:pPr>
-            <a:r>
-              <a:rPr lang="en-US" sz="1100" dirty="0">
-                <a:solidFill>
-                  <a:schemeClr val="tx1"/>
-                </a:solidFill>
-                <a:latin typeface="Segoe UI" panose="020B0502040204020203" pitchFamily="34" charset="0"/>
-                <a:cs typeface="Segoe UI" panose="020B0502040204020203" pitchFamily="34" charset="0"/>
-              </a:rPr>
-              <a:t>Constructor Injection</a:t>
-            </a:r>
-          </a:p>
-          <a:p>
-            <a:pPr>
-              <a:spcAft>
-                <a:spcPts val="600"/>
-              </a:spcAft>
-              <a:defRPr/>
-            </a:pPr>
-            <a:r>
-              <a:rPr lang="en-US" sz="1100" dirty="0">
-                <a:solidFill>
-                  <a:schemeClr val="tx1"/>
-                </a:solidFill>
-                <a:latin typeface="Segoe UI" panose="020B0502040204020203" pitchFamily="34" charset="0"/>
-                <a:cs typeface="Segoe UI" panose="020B0502040204020203" pitchFamily="34" charset="0"/>
-              </a:rPr>
-              <a:t>Property Injection</a:t>
-            </a:r>
-          </a:p>
-          <a:p>
-            <a:pPr marL="0" indent="0">
-              <a:spcAft>
-                <a:spcPts val="600"/>
-              </a:spcAft>
-              <a:buNone/>
-              <a:defRPr/>
-            </a:pPr>
-            <a:r>
-              <a:rPr lang="en-US" sz="1100" dirty="0">
-                <a:solidFill>
-                  <a:schemeClr val="accent4"/>
-                </a:solidFill>
-                <a:latin typeface="Segoe UI" panose="020B0502040204020203" pitchFamily="34" charset="0"/>
-                <a:cs typeface="Segoe UI" panose="020B0502040204020203" pitchFamily="34" charset="0"/>
-              </a:rPr>
-              <a:t>Benefit:</a:t>
-            </a:r>
-          </a:p>
-          <a:p>
-            <a:pPr marL="0" indent="0">
-              <a:spcAft>
-                <a:spcPts val="600"/>
-              </a:spcAft>
-              <a:buNone/>
-              <a:defRPr/>
-            </a:pPr>
-            <a:r>
-              <a:rPr lang="en-US" sz="1100" dirty="0">
-                <a:solidFill>
-                  <a:schemeClr val="tx1"/>
-                </a:solidFill>
-                <a:latin typeface="Segoe UI" panose="020B0502040204020203" pitchFamily="34" charset="0"/>
-                <a:cs typeface="Segoe UI" panose="020B0502040204020203" pitchFamily="34" charset="0"/>
-              </a:rPr>
-              <a:t>This allows you to swap in different implementor without having to modify the main class.</a:t>
-            </a:r>
-          </a:p>
-          <a:p>
-            <a:pPr marL="0" indent="0">
-              <a:spcAft>
-                <a:spcPts val="600"/>
-              </a:spcAft>
-              <a:buNone/>
-              <a:defRPr/>
-            </a:pPr>
-            <a:endParaRPr lang="en-US" sz="1100" dirty="0">
-              <a:solidFill>
-                <a:schemeClr val="tx1"/>
-              </a:solidFill>
-              <a:latin typeface="Segoe UI" panose="020B0502040204020203" pitchFamily="34" charset="0"/>
-              <a:cs typeface="Segoe UI" panose="020B0502040204020203" pitchFamily="34" charset="0"/>
-            </a:endParaRPr>
-          </a:p>
-          <a:p>
-            <a:pPr marL="0" indent="0">
-              <a:spcAft>
-                <a:spcPts val="600"/>
-              </a:spcAft>
-              <a:buNone/>
-              <a:defRPr/>
-            </a:pPr>
-            <a:endParaRPr lang="en-US" sz="1100" dirty="0">
-              <a:solidFill>
-                <a:schemeClr val="accent4"/>
-              </a:solidFill>
-              <a:latin typeface="Segoe UI" panose="020B0502040204020203" pitchFamily="34" charset="0"/>
-              <a:cs typeface="Segoe UI" panose="020B0502040204020203" pitchFamily="34" charset="0"/>
-            </a:endParaRPr>
-          </a:p>
-        </p:txBody>
-      </p:sp>
-      <p:pic>
-        <p:nvPicPr>
-          <p:cNvPr id="14" name="Picture 13">
-            <a:extLst>
-              <a:ext uri="{FF2B5EF4-FFF2-40B4-BE49-F238E27FC236}">
-                <a16:creationId xmlns:a16="http://schemas.microsoft.com/office/drawing/2014/main" id="{516E338B-8BF2-402E-0398-0A32171FF5E3}"/>
-              </a:ext>
-            </a:extLst>
-          </p:cNvPr>
-          <p:cNvPicPr>
-            <a:picLocks noChangeAspect="1"/>
-          </p:cNvPicPr>
-          <p:nvPr/>
-        </p:nvPicPr>
-        <p:blipFill>
-          <a:blip r:embed="rId2"/>
-          <a:stretch>
-            <a:fillRect/>
-          </a:stretch>
-        </p:blipFill>
-        <p:spPr>
-          <a:xfrm>
-            <a:off x="5089941" y="1339746"/>
-            <a:ext cx="6564127" cy="3532342"/>
-          </a:xfrm>
-          <a:prstGeom prst="rect">
-            <a:avLst/>
-          </a:prstGeom>
-        </p:spPr>
-      </p:pic>
-    </p:spTree>
-    <p:extLst>
-      <p:ext uri="{BB962C8B-B14F-4D97-AF65-F5344CB8AC3E}">
-        <p14:creationId xmlns:p14="http://schemas.microsoft.com/office/powerpoint/2010/main" val="655002835"/>
-      </p:ext>
-    </p:extLst>
-  </p:cSld>
-  <p:clrMapOvr>
-    <a:masterClrMapping/>
-  </p:clrMapOvr>
-</p:sld>
-</file>
-
 <file path=ppt/slides/slide2.xml><?xml version="1.0" encoding="utf-8"?>
 <p:sld xmlns:a="http://schemas.openxmlformats.org/drawingml/2006/main" xmlns:r="http://schemas.openxmlformats.org/officeDocument/2006/relationships" xmlns:p="http://schemas.openxmlformats.org/presentationml/2006/main">
   <p:cSld>
@@ -6998,6 +7139,596 @@
 </file>
 
 <file path=ppt/slides/slide20.xml><?xml version="1.0" encoding="utf-8"?>
+<p:sld xmlns:a="http://schemas.openxmlformats.org/drawingml/2006/main" xmlns:r="http://schemas.openxmlformats.org/officeDocument/2006/relationships" xmlns:p="http://schemas.openxmlformats.org/presentationml/2006/main">
+  <p:cSld>
+    <p:spTree>
+      <p:nvGrpSpPr>
+        <p:cNvPr id="1" name=""/>
+        <p:cNvGrpSpPr/>
+        <p:nvPr/>
+      </p:nvGrpSpPr>
+      <p:grpSpPr>
+        <a:xfrm>
+          <a:off x="0" y="0"/>
+          <a:ext cx="0" cy="0"/>
+          <a:chOff x="0" y="0"/>
+          <a:chExt cx="0" cy="0"/>
+        </a:xfrm>
+      </p:grpSpPr>
+      <p:sp>
+        <p:nvSpPr>
+          <p:cNvPr id="3" name="Title 2"/>
+          <p:cNvSpPr>
+            <a:spLocks noGrp="1"/>
+          </p:cNvSpPr>
+          <p:nvPr>
+            <p:ph type="title"/>
+          </p:nvPr>
+        </p:nvSpPr>
+        <p:spPr/>
+        <p:txBody>
+          <a:bodyPr/>
+          <a:lstStyle/>
+          <a:p>
+            <a:r>
+              <a:rPr lang="en-US" dirty="0"/>
+              <a:t>DEPENDENCY INJECTION</a:t>
+            </a:r>
+          </a:p>
+        </p:txBody>
+      </p:sp>
+      <p:sp>
+        <p:nvSpPr>
+          <p:cNvPr id="8" name="Content Placeholder 17">
+            <a:extLst>
+              <a:ext uri="{FF2B5EF4-FFF2-40B4-BE49-F238E27FC236}">
+                <a16:creationId xmlns:a16="http://schemas.microsoft.com/office/drawing/2014/main" id="{1F093688-A3DE-DD89-3E93-93F8C8A28A12}"/>
+              </a:ext>
+            </a:extLst>
+          </p:cNvPr>
+          <p:cNvSpPr txBox="1">
+            <a:spLocks/>
+          </p:cNvSpPr>
+          <p:nvPr/>
+        </p:nvSpPr>
+        <p:spPr>
+          <a:xfrm>
+            <a:off x="604345" y="1339746"/>
+            <a:ext cx="4615726" cy="5178500"/>
+          </a:xfrm>
+          <a:prstGeom prst="rect">
+            <a:avLst/>
+          </a:prstGeom>
+        </p:spPr>
+        <p:txBody>
+          <a:bodyPr vert="horz" lIns="91440" tIns="45720" rIns="91440" bIns="45720" rtlCol="0">
+            <a:normAutofit/>
+          </a:bodyPr>
+          <a:lstStyle>
+            <a:lvl1pPr marL="228600" indent="-228600" algn="l" defTabSz="914400" rtl="0" eaLnBrk="1" latinLnBrk="0" hangingPunct="1">
+              <a:lnSpc>
+                <a:spcPts val="1800"/>
+              </a:lnSpc>
+              <a:spcBef>
+                <a:spcPts val="1000"/>
+              </a:spcBef>
+              <a:spcAft>
+                <a:spcPts val="1000"/>
+              </a:spcAft>
+              <a:buFont typeface="Arial" panose="020B0604020202020204" pitchFamily="34" charset="0"/>
+              <a:buChar char="•"/>
+              <a:defRPr lang="en-US" sz="1200" kern="1200" smtClean="0">
+                <a:solidFill>
+                  <a:schemeClr val="tx1">
+                    <a:lumMod val="75000"/>
+                    <a:lumOff val="25000"/>
+                  </a:schemeClr>
+                </a:solidFill>
+                <a:latin typeface="+mn-lt"/>
+                <a:ea typeface="+mn-ea"/>
+                <a:cs typeface="+mn-cs"/>
+              </a:defRPr>
+            </a:lvl1pPr>
+            <a:lvl2pPr marL="685800" indent="-228600" algn="l" defTabSz="914400" rtl="0" eaLnBrk="1" latinLnBrk="0" hangingPunct="1">
+              <a:lnSpc>
+                <a:spcPts val="1800"/>
+              </a:lnSpc>
+              <a:spcBef>
+                <a:spcPts val="1000"/>
+              </a:spcBef>
+              <a:spcAft>
+                <a:spcPts val="1000"/>
+              </a:spcAft>
+              <a:buFont typeface="Arial" panose="020B0604020202020204" pitchFamily="34" charset="0"/>
+              <a:buChar char="•"/>
+              <a:defRPr lang="en-US" sz="1200" kern="1200" smtClean="0">
+                <a:solidFill>
+                  <a:schemeClr val="tx1">
+                    <a:lumMod val="75000"/>
+                    <a:lumOff val="25000"/>
+                  </a:schemeClr>
+                </a:solidFill>
+                <a:latin typeface="+mn-lt"/>
+                <a:ea typeface="+mn-ea"/>
+                <a:cs typeface="+mn-cs"/>
+              </a:defRPr>
+            </a:lvl2pPr>
+            <a:lvl3pPr marL="1143000" indent="-228600" algn="l" defTabSz="914400" rtl="0" eaLnBrk="1" latinLnBrk="0" hangingPunct="1">
+              <a:lnSpc>
+                <a:spcPts val="1800"/>
+              </a:lnSpc>
+              <a:spcBef>
+                <a:spcPts val="1000"/>
+              </a:spcBef>
+              <a:spcAft>
+                <a:spcPts val="1000"/>
+              </a:spcAft>
+              <a:buFont typeface="Arial" panose="020B0604020202020204" pitchFamily="34" charset="0"/>
+              <a:buChar char="•"/>
+              <a:defRPr lang="en-US" sz="1200" kern="1200" smtClean="0">
+                <a:solidFill>
+                  <a:schemeClr val="tx1">
+                    <a:lumMod val="75000"/>
+                    <a:lumOff val="25000"/>
+                  </a:schemeClr>
+                </a:solidFill>
+                <a:latin typeface="+mn-lt"/>
+                <a:ea typeface="+mn-ea"/>
+                <a:cs typeface="+mn-cs"/>
+              </a:defRPr>
+            </a:lvl3pPr>
+            <a:lvl4pPr marL="1600200" indent="-228600" algn="l" defTabSz="914400" rtl="0" eaLnBrk="1" latinLnBrk="0" hangingPunct="1">
+              <a:lnSpc>
+                <a:spcPts val="1800"/>
+              </a:lnSpc>
+              <a:spcBef>
+                <a:spcPts val="1000"/>
+              </a:spcBef>
+              <a:spcAft>
+                <a:spcPts val="1000"/>
+              </a:spcAft>
+              <a:buFont typeface="Arial" panose="020B0604020202020204" pitchFamily="34" charset="0"/>
+              <a:buChar char="•"/>
+              <a:defRPr lang="en-US" sz="1200" kern="1200" smtClean="0">
+                <a:solidFill>
+                  <a:schemeClr val="tx1">
+                    <a:lumMod val="75000"/>
+                    <a:lumOff val="25000"/>
+                  </a:schemeClr>
+                </a:solidFill>
+                <a:latin typeface="+mn-lt"/>
+                <a:ea typeface="+mn-ea"/>
+                <a:cs typeface="+mn-cs"/>
+              </a:defRPr>
+            </a:lvl4pPr>
+            <a:lvl5pPr marL="2057400" indent="-228600" algn="l" defTabSz="914400" rtl="0" eaLnBrk="1" latinLnBrk="0" hangingPunct="1">
+              <a:lnSpc>
+                <a:spcPts val="1800"/>
+              </a:lnSpc>
+              <a:spcBef>
+                <a:spcPts val="1000"/>
+              </a:spcBef>
+              <a:spcAft>
+                <a:spcPts val="1000"/>
+              </a:spcAft>
+              <a:buFont typeface="Arial" panose="020B0604020202020204" pitchFamily="34" charset="0"/>
+              <a:buChar char="•"/>
+              <a:defRPr lang="en-US" sz="1200" kern="1200">
+                <a:solidFill>
+                  <a:schemeClr val="tx1">
+                    <a:lumMod val="75000"/>
+                    <a:lumOff val="25000"/>
+                  </a:schemeClr>
+                </a:solidFill>
+                <a:latin typeface="+mn-lt"/>
+                <a:ea typeface="+mn-ea"/>
+                <a:cs typeface="+mn-cs"/>
+              </a:defRPr>
+            </a:lvl5pPr>
+            <a:lvl6pPr marL="2514600" indent="-228600" algn="l" defTabSz="914400" rtl="0" eaLnBrk="1" latinLnBrk="0" hangingPunct="1">
+              <a:lnSpc>
+                <a:spcPct val="90000"/>
+              </a:lnSpc>
+              <a:spcBef>
+                <a:spcPct val="30000"/>
+              </a:spcBef>
+              <a:buFont typeface="Arial" panose="020B0604020202020204" pitchFamily="34" charset="0"/>
+              <a:buChar char="•"/>
+              <a:defRPr sz="1800" kern="1200">
+                <a:solidFill>
+                  <a:schemeClr val="tx1"/>
+                </a:solidFill>
+                <a:latin typeface="+mn-lt"/>
+                <a:ea typeface="+mn-ea"/>
+                <a:cs typeface="+mn-cs"/>
+              </a:defRPr>
+            </a:lvl6pPr>
+            <a:lvl7pPr marL="2971800" indent="-228600" algn="l" defTabSz="914400" rtl="0" eaLnBrk="1" latinLnBrk="0" hangingPunct="1">
+              <a:lnSpc>
+                <a:spcPct val="90000"/>
+              </a:lnSpc>
+              <a:spcBef>
+                <a:spcPct val="30000"/>
+              </a:spcBef>
+              <a:buFont typeface="Arial" panose="020B0604020202020204" pitchFamily="34" charset="0"/>
+              <a:buChar char="•"/>
+              <a:defRPr sz="1800" kern="1200">
+                <a:solidFill>
+                  <a:schemeClr val="tx1"/>
+                </a:solidFill>
+                <a:latin typeface="+mn-lt"/>
+                <a:ea typeface="+mn-ea"/>
+                <a:cs typeface="+mn-cs"/>
+              </a:defRPr>
+            </a:lvl7pPr>
+            <a:lvl8pPr marL="3429000" indent="-228600" algn="l" defTabSz="914400" rtl="0" eaLnBrk="1" latinLnBrk="0" hangingPunct="1">
+              <a:lnSpc>
+                <a:spcPct val="90000"/>
+              </a:lnSpc>
+              <a:spcBef>
+                <a:spcPct val="30000"/>
+              </a:spcBef>
+              <a:buFont typeface="Arial" panose="020B0604020202020204" pitchFamily="34" charset="0"/>
+              <a:buChar char="•"/>
+              <a:defRPr sz="1800" kern="1200">
+                <a:solidFill>
+                  <a:schemeClr val="tx1"/>
+                </a:solidFill>
+                <a:latin typeface="+mn-lt"/>
+                <a:ea typeface="+mn-ea"/>
+                <a:cs typeface="+mn-cs"/>
+              </a:defRPr>
+            </a:lvl8pPr>
+            <a:lvl9pPr marL="3886200" indent="-228600" algn="l" defTabSz="914400" rtl="0" eaLnBrk="1" latinLnBrk="0" hangingPunct="1">
+              <a:lnSpc>
+                <a:spcPct val="90000"/>
+              </a:lnSpc>
+              <a:spcBef>
+                <a:spcPct val="30000"/>
+              </a:spcBef>
+              <a:buFont typeface="Arial" panose="020B0604020202020204" pitchFamily="34" charset="0"/>
+              <a:buChar char="•"/>
+              <a:defRPr sz="1800" kern="1200">
+                <a:solidFill>
+                  <a:schemeClr val="tx1"/>
+                </a:solidFill>
+                <a:latin typeface="+mn-lt"/>
+                <a:ea typeface="+mn-ea"/>
+                <a:cs typeface="+mn-cs"/>
+              </a:defRPr>
+            </a:lvl9pPr>
+          </a:lstStyle>
+          <a:p>
+            <a:pPr marL="0" indent="0">
+              <a:spcAft>
+                <a:spcPts val="600"/>
+              </a:spcAft>
+              <a:buNone/>
+              <a:defRPr/>
+            </a:pPr>
+            <a:r>
+              <a:rPr lang="en-US" sz="1100" dirty="0">
+                <a:solidFill>
+                  <a:schemeClr val="tx1"/>
+                </a:solidFill>
+                <a:latin typeface="Segoe UI" panose="020B0502040204020203" pitchFamily="34" charset="0"/>
+                <a:cs typeface="Segoe UI" panose="020B0502040204020203" pitchFamily="34" charset="0"/>
+              </a:rPr>
+              <a:t>It is a pattern of injecting a class’s dependencies into it at runtime.</a:t>
+            </a:r>
+          </a:p>
+          <a:p>
+            <a:pPr>
+              <a:spcAft>
+                <a:spcPts val="600"/>
+              </a:spcAft>
+              <a:defRPr/>
+            </a:pPr>
+            <a:r>
+              <a:rPr lang="en-US" sz="1100" dirty="0">
+                <a:solidFill>
+                  <a:schemeClr val="tx1"/>
+                </a:solidFill>
+                <a:latin typeface="Segoe UI" panose="020B0502040204020203" pitchFamily="34" charset="0"/>
+                <a:cs typeface="Segoe UI" panose="020B0502040204020203" pitchFamily="34" charset="0"/>
+              </a:rPr>
+              <a:t>Constructor Injection</a:t>
+            </a:r>
+          </a:p>
+          <a:p>
+            <a:pPr>
+              <a:spcAft>
+                <a:spcPts val="600"/>
+              </a:spcAft>
+              <a:defRPr/>
+            </a:pPr>
+            <a:r>
+              <a:rPr lang="en-US" sz="1100" dirty="0">
+                <a:solidFill>
+                  <a:schemeClr val="tx1"/>
+                </a:solidFill>
+                <a:latin typeface="Segoe UI" panose="020B0502040204020203" pitchFamily="34" charset="0"/>
+                <a:cs typeface="Segoe UI" panose="020B0502040204020203" pitchFamily="34" charset="0"/>
+              </a:rPr>
+              <a:t>Property Injection</a:t>
+            </a:r>
+          </a:p>
+          <a:p>
+            <a:pPr marL="0" indent="0">
+              <a:spcAft>
+                <a:spcPts val="600"/>
+              </a:spcAft>
+              <a:buNone/>
+              <a:defRPr/>
+            </a:pPr>
+            <a:r>
+              <a:rPr lang="en-US" sz="1100" dirty="0">
+                <a:solidFill>
+                  <a:schemeClr val="accent4"/>
+                </a:solidFill>
+                <a:latin typeface="Segoe UI" panose="020B0502040204020203" pitchFamily="34" charset="0"/>
+                <a:cs typeface="Segoe UI" panose="020B0502040204020203" pitchFamily="34" charset="0"/>
+              </a:rPr>
+              <a:t>Benefit:</a:t>
+            </a:r>
+          </a:p>
+          <a:p>
+            <a:pPr marL="0" indent="0">
+              <a:spcAft>
+                <a:spcPts val="600"/>
+              </a:spcAft>
+              <a:buNone/>
+              <a:defRPr/>
+            </a:pPr>
+            <a:r>
+              <a:rPr lang="en-US" sz="1100" dirty="0">
+                <a:solidFill>
+                  <a:schemeClr val="tx1"/>
+                </a:solidFill>
+                <a:latin typeface="Segoe UI" panose="020B0502040204020203" pitchFamily="34" charset="0"/>
+                <a:cs typeface="Segoe UI" panose="020B0502040204020203" pitchFamily="34" charset="0"/>
+              </a:rPr>
+              <a:t>This allows you to swap in different implementor without having to modify the main class.</a:t>
+            </a:r>
+          </a:p>
+          <a:p>
+            <a:pPr marL="0" indent="0">
+              <a:spcAft>
+                <a:spcPts val="600"/>
+              </a:spcAft>
+              <a:buNone/>
+              <a:defRPr/>
+            </a:pPr>
+            <a:endParaRPr lang="en-US" sz="1100" dirty="0">
+              <a:solidFill>
+                <a:schemeClr val="tx1"/>
+              </a:solidFill>
+              <a:latin typeface="Segoe UI" panose="020B0502040204020203" pitchFamily="34" charset="0"/>
+              <a:cs typeface="Segoe UI" panose="020B0502040204020203" pitchFamily="34" charset="0"/>
+            </a:endParaRPr>
+          </a:p>
+          <a:p>
+            <a:pPr marL="0" indent="0">
+              <a:spcAft>
+                <a:spcPts val="600"/>
+              </a:spcAft>
+              <a:buNone/>
+              <a:defRPr/>
+            </a:pPr>
+            <a:endParaRPr lang="en-US" sz="1100" dirty="0">
+              <a:solidFill>
+                <a:schemeClr val="accent4"/>
+              </a:solidFill>
+              <a:latin typeface="Segoe UI" panose="020B0502040204020203" pitchFamily="34" charset="0"/>
+              <a:cs typeface="Segoe UI" panose="020B0502040204020203" pitchFamily="34" charset="0"/>
+            </a:endParaRPr>
+          </a:p>
+        </p:txBody>
+      </p:sp>
+      <p:pic>
+        <p:nvPicPr>
+          <p:cNvPr id="14" name="Picture 13">
+            <a:extLst>
+              <a:ext uri="{FF2B5EF4-FFF2-40B4-BE49-F238E27FC236}">
+                <a16:creationId xmlns:a16="http://schemas.microsoft.com/office/drawing/2014/main" id="{516E338B-8BF2-402E-0398-0A32171FF5E3}"/>
+              </a:ext>
+            </a:extLst>
+          </p:cNvPr>
+          <p:cNvPicPr>
+            <a:picLocks noChangeAspect="1"/>
+          </p:cNvPicPr>
+          <p:nvPr/>
+        </p:nvPicPr>
+        <p:blipFill>
+          <a:blip r:embed="rId2"/>
+          <a:stretch>
+            <a:fillRect/>
+          </a:stretch>
+        </p:blipFill>
+        <p:spPr>
+          <a:xfrm>
+            <a:off x="5089941" y="1339746"/>
+            <a:ext cx="6564127" cy="3241132"/>
+          </a:xfrm>
+          <a:prstGeom prst="rect">
+            <a:avLst/>
+          </a:prstGeom>
+        </p:spPr>
+      </p:pic>
+      <p:pic>
+        <p:nvPicPr>
+          <p:cNvPr id="5" name="Picture 4">
+            <a:extLst>
+              <a:ext uri="{FF2B5EF4-FFF2-40B4-BE49-F238E27FC236}">
+                <a16:creationId xmlns:a16="http://schemas.microsoft.com/office/drawing/2014/main" id="{A95F0C6D-3E5D-017C-ED93-55FBDF0C04EC}"/>
+              </a:ext>
+            </a:extLst>
+          </p:cNvPr>
+          <p:cNvPicPr>
+            <a:picLocks noChangeAspect="1"/>
+          </p:cNvPicPr>
+          <p:nvPr/>
+        </p:nvPicPr>
+        <p:blipFill>
+          <a:blip r:embed="rId3"/>
+          <a:stretch>
+            <a:fillRect/>
+          </a:stretch>
+        </p:blipFill>
+        <p:spPr>
+          <a:xfrm>
+            <a:off x="365137" y="5035750"/>
+            <a:ext cx="5394711" cy="175616"/>
+          </a:xfrm>
+          <a:prstGeom prst="rect">
+            <a:avLst/>
+          </a:prstGeom>
+        </p:spPr>
+      </p:pic>
+      <p:pic>
+        <p:nvPicPr>
+          <p:cNvPr id="6" name="Picture 5">
+            <a:extLst>
+              <a:ext uri="{FF2B5EF4-FFF2-40B4-BE49-F238E27FC236}">
+                <a16:creationId xmlns:a16="http://schemas.microsoft.com/office/drawing/2014/main" id="{0ECA48D0-FACD-1CEA-B014-E4BE55CF588F}"/>
+              </a:ext>
+            </a:extLst>
+          </p:cNvPr>
+          <p:cNvPicPr>
+            <a:picLocks noChangeAspect="1"/>
+          </p:cNvPicPr>
+          <p:nvPr/>
+        </p:nvPicPr>
+        <p:blipFill>
+          <a:blip r:embed="rId4"/>
+          <a:stretch>
+            <a:fillRect/>
+          </a:stretch>
+        </p:blipFill>
+        <p:spPr>
+          <a:xfrm>
+            <a:off x="407764" y="6174374"/>
+            <a:ext cx="5352084" cy="153267"/>
+          </a:xfrm>
+          <a:prstGeom prst="rect">
+            <a:avLst/>
+          </a:prstGeom>
+        </p:spPr>
+      </p:pic>
+      <p:sp>
+        <p:nvSpPr>
+          <p:cNvPr id="7" name="Oval 6">
+            <a:extLst>
+              <a:ext uri="{FF2B5EF4-FFF2-40B4-BE49-F238E27FC236}">
+                <a16:creationId xmlns:a16="http://schemas.microsoft.com/office/drawing/2014/main" id="{E2179ED9-D388-9559-35BC-954B1EBB707E}"/>
+              </a:ext>
+            </a:extLst>
+          </p:cNvPr>
+          <p:cNvSpPr/>
+          <p:nvPr/>
+        </p:nvSpPr>
+        <p:spPr>
+          <a:xfrm>
+            <a:off x="1491447" y="4580878"/>
+            <a:ext cx="2539013" cy="292964"/>
+          </a:xfrm>
+          <a:prstGeom prst="ellipse">
+            <a:avLst/>
+          </a:prstGeom>
+        </p:spPr>
+        <p:style>
+          <a:lnRef idx="2">
+            <a:schemeClr val="accent1">
+              <a:shade val="50000"/>
+            </a:schemeClr>
+          </a:lnRef>
+          <a:fillRef idx="1">
+            <a:schemeClr val="accent1"/>
+          </a:fillRef>
+          <a:effectRef idx="0">
+            <a:schemeClr val="accent1"/>
+          </a:effectRef>
+          <a:fontRef idx="minor">
+            <a:schemeClr val="lt1"/>
+          </a:fontRef>
+        </p:style>
+        <p:txBody>
+          <a:bodyPr rtlCol="0" anchor="ctr"/>
+          <a:lstStyle/>
+          <a:p>
+            <a:pPr algn="ctr"/>
+            <a:r>
+              <a:rPr lang="en-US" dirty="0"/>
+              <a:t>Before Change</a:t>
+            </a:r>
+            <a:endParaRPr lang="en-IN" dirty="0"/>
+          </a:p>
+        </p:txBody>
+      </p:sp>
+      <p:sp>
+        <p:nvSpPr>
+          <p:cNvPr id="9" name="Oval 8">
+            <a:extLst>
+              <a:ext uri="{FF2B5EF4-FFF2-40B4-BE49-F238E27FC236}">
+                <a16:creationId xmlns:a16="http://schemas.microsoft.com/office/drawing/2014/main" id="{4D2DAC88-F166-B320-04F6-95DC5E910840}"/>
+              </a:ext>
+            </a:extLst>
+          </p:cNvPr>
+          <p:cNvSpPr/>
+          <p:nvPr/>
+        </p:nvSpPr>
+        <p:spPr>
+          <a:xfrm>
+            <a:off x="1491446" y="5678911"/>
+            <a:ext cx="2539013" cy="292964"/>
+          </a:xfrm>
+          <a:prstGeom prst="ellipse">
+            <a:avLst/>
+          </a:prstGeom>
+        </p:spPr>
+        <p:style>
+          <a:lnRef idx="2">
+            <a:schemeClr val="accent1">
+              <a:shade val="50000"/>
+            </a:schemeClr>
+          </a:lnRef>
+          <a:fillRef idx="1">
+            <a:schemeClr val="accent1"/>
+          </a:fillRef>
+          <a:effectRef idx="0">
+            <a:schemeClr val="accent1"/>
+          </a:effectRef>
+          <a:fontRef idx="minor">
+            <a:schemeClr val="lt1"/>
+          </a:fontRef>
+        </p:style>
+        <p:txBody>
+          <a:bodyPr rtlCol="0" anchor="ctr"/>
+          <a:lstStyle/>
+          <a:p>
+            <a:pPr algn="ctr"/>
+            <a:r>
+              <a:rPr lang="en-US" dirty="0"/>
+              <a:t>After Change</a:t>
+            </a:r>
+            <a:endParaRPr lang="en-IN" dirty="0"/>
+          </a:p>
+        </p:txBody>
+      </p:sp>
+    </p:spTree>
+    <p:extLst>
+      <p:ext uri="{BB962C8B-B14F-4D97-AF65-F5344CB8AC3E}">
+        <p14:creationId xmlns:p14="http://schemas.microsoft.com/office/powerpoint/2010/main" val="655002835"/>
+      </p:ext>
+    </p:extLst>
+  </p:cSld>
+  <p:clrMapOvr>
+    <a:masterClrMapping/>
+  </p:clrMapOvr>
+</p:sld>
+</file>
+
+<file path=ppt/slides/slide21.xml><?xml version="1.0" encoding="utf-8"?>
 <p:sld xmlns:a="http://schemas.openxmlformats.org/drawingml/2006/main" xmlns:r="http://schemas.openxmlformats.org/officeDocument/2006/relationships" xmlns:p="http://schemas.openxmlformats.org/presentationml/2006/main">
   <p:cSld>
     <p:spTree>
@@ -7354,7 +8085,7 @@
         <p:spPr>
           <a:xfrm>
             <a:off x="521205" y="1285570"/>
-            <a:ext cx="6368953" cy="5186486"/>
+            <a:ext cx="5870717" cy="5186486"/>
           </a:xfrm>
           <a:prstGeom prst="rect">
             <a:avLst/>
@@ -7362,7 +8093,7 @@
         </p:spPr>
         <p:txBody>
           <a:bodyPr vert="horz" lIns="91440" tIns="45720" rIns="91440" bIns="45720" rtlCol="0">
-            <a:normAutofit fontScale="85000" lnSpcReduction="10000"/>
+            <a:normAutofit/>
           </a:bodyPr>
           <a:lstStyle>
             <a:lvl1pPr marL="228600" indent="-228600" algn="l" defTabSz="914400" rtl="0" eaLnBrk="1" latinLnBrk="0" hangingPunct="1">
@@ -7724,7 +8455,7 @@
                 <a:latin typeface="Segoe UI" panose="020B0502040204020203" pitchFamily="34" charset="0"/>
                 <a:cs typeface="Segoe UI" panose="020B0502040204020203" pitchFamily="34" charset="0"/>
               </a:rPr>
-              <a:t>.</a:t>
+              <a:t>. (Follow standard practices)</a:t>
             </a:r>
             <a:endParaRPr lang="en-US" sz="1100" dirty="0">
               <a:latin typeface="Segoe UI" panose="020B0502040204020203" pitchFamily="34" charset="0"/>
@@ -7773,189 +8504,12 @@
                 <a:latin typeface="Segoe UI" panose="020B0502040204020203" pitchFamily="34" charset="0"/>
                 <a:cs typeface="Segoe UI" panose="020B0502040204020203" pitchFamily="34" charset="0"/>
               </a:rPr>
-              <a:t>niform throughout the process without any change.</a:t>
+              <a:t>niform design throughout the process without any change.</a:t>
             </a:r>
             <a:endParaRPr lang="en-US" sz="1100" i="1" dirty="0">
               <a:latin typeface="Segoe UI" panose="020B0502040204020203" pitchFamily="34" charset="0"/>
               <a:cs typeface="Segoe UI" panose="020B0502040204020203" pitchFamily="34" charset="0"/>
             </a:endParaRPr>
-          </a:p>
-          <a:p>
-            <a:pPr lvl="0">
-              <a:spcAft>
-                <a:spcPts val="600"/>
-              </a:spcAft>
-              <a:buFont typeface="+mj-lt"/>
-              <a:buAutoNum type="arabicPeriod"/>
-              <a:defRPr/>
-            </a:pPr>
-            <a:r>
-              <a:rPr lang="en-US" b="1" dirty="0">
-                <a:latin typeface="Segoe UI" panose="020B0502040204020203" pitchFamily="34" charset="0"/>
-                <a:cs typeface="Segoe UI" panose="020B0502040204020203" pitchFamily="34" charset="0"/>
-              </a:rPr>
-              <a:t>Accommodate change</a:t>
-            </a:r>
-            <a:r>
-              <a:rPr lang="en-US" dirty="0">
-                <a:latin typeface="Segoe UI" panose="020B0502040204020203" pitchFamily="34" charset="0"/>
-                <a:cs typeface="Segoe UI" panose="020B0502040204020203" pitchFamily="34" charset="0"/>
-              </a:rPr>
-              <a:t> – </a:t>
-            </a:r>
-            <a:r>
-              <a:rPr lang="en-US" sz="1100" i="1" dirty="0">
-                <a:latin typeface="Segoe UI" panose="020B0502040204020203" pitchFamily="34" charset="0"/>
-                <a:cs typeface="Segoe UI" panose="020B0502040204020203" pitchFamily="34" charset="0"/>
-              </a:rPr>
-              <a:t>Adjust the change as per user’s need</a:t>
-            </a:r>
-            <a:r>
-              <a:rPr lang="en-US" dirty="0">
-                <a:latin typeface="Segoe UI" panose="020B0502040204020203" pitchFamily="34" charset="0"/>
-                <a:cs typeface="Segoe UI" panose="020B0502040204020203" pitchFamily="34" charset="0"/>
-              </a:rPr>
-              <a:t>.</a:t>
-            </a:r>
-          </a:p>
-          <a:p>
-            <a:pPr lvl="0">
-              <a:spcAft>
-                <a:spcPts val="600"/>
-              </a:spcAft>
-              <a:buFont typeface="+mj-lt"/>
-              <a:buAutoNum type="arabicPeriod"/>
-              <a:defRPr/>
-            </a:pPr>
-            <a:r>
-              <a:rPr lang="en-US" b="1" dirty="0">
-                <a:latin typeface="Segoe UI" panose="020B0502040204020203" pitchFamily="34" charset="0"/>
-                <a:cs typeface="Segoe UI" panose="020B0502040204020203" pitchFamily="34" charset="0"/>
-              </a:rPr>
-              <a:t>Degrade gently</a:t>
-            </a:r>
-            <a:r>
-              <a:rPr lang="en-US" dirty="0">
-                <a:latin typeface="Segoe UI" panose="020B0502040204020203" pitchFamily="34" charset="0"/>
-                <a:cs typeface="Segoe UI" panose="020B0502040204020203" pitchFamily="34" charset="0"/>
-              </a:rPr>
-              <a:t> - </a:t>
-            </a:r>
-            <a:r>
-              <a:rPr lang="en-US" sz="1100" b="0" i="1" dirty="0">
-                <a:solidFill>
-                  <a:srgbClr val="273239"/>
-                </a:solidFill>
-                <a:effectLst/>
-                <a:latin typeface="Segoe UI" panose="020B0502040204020203" pitchFamily="34" charset="0"/>
-                <a:cs typeface="Segoe UI" panose="020B0502040204020203" pitchFamily="34" charset="0"/>
-              </a:rPr>
-              <a:t>Work properly even if an error occurs during the execution.</a:t>
-            </a:r>
-            <a:endParaRPr lang="en-US" sz="1100" i="1" dirty="0">
-              <a:latin typeface="Segoe UI" panose="020B0502040204020203" pitchFamily="34" charset="0"/>
-              <a:cs typeface="Segoe UI" panose="020B0502040204020203" pitchFamily="34" charset="0"/>
-            </a:endParaRPr>
-          </a:p>
-          <a:p>
-            <a:pPr lvl="0">
-              <a:spcAft>
-                <a:spcPts val="600"/>
-              </a:spcAft>
-              <a:buFont typeface="+mj-lt"/>
-              <a:buAutoNum type="arabicPeriod"/>
-              <a:defRPr/>
-            </a:pPr>
-            <a:r>
-              <a:rPr lang="en-US" b="1" dirty="0">
-                <a:latin typeface="Segoe UI" panose="020B0502040204020203" pitchFamily="34" charset="0"/>
-                <a:cs typeface="Segoe UI" panose="020B0502040204020203" pitchFamily="34" charset="0"/>
-              </a:rPr>
-              <a:t>Assessed for quality</a:t>
-            </a:r>
-            <a:r>
-              <a:rPr lang="en-US" dirty="0">
-                <a:latin typeface="Segoe UI" panose="020B0502040204020203" pitchFamily="34" charset="0"/>
-                <a:cs typeface="Segoe UI" panose="020B0502040204020203" pitchFamily="34" charset="0"/>
-              </a:rPr>
-              <a:t> - </a:t>
-            </a:r>
-            <a:r>
-              <a:rPr lang="en-US" sz="1100" i="1" dirty="0">
-                <a:latin typeface="Segoe UI" panose="020B0502040204020203" pitchFamily="34" charset="0"/>
-                <a:cs typeface="Segoe UI" panose="020B0502040204020203" pitchFamily="34" charset="0"/>
-              </a:rPr>
-              <a:t>The quality of the design needs to be checked and focused</a:t>
-            </a:r>
-            <a:r>
-              <a:rPr lang="en-US" dirty="0">
-                <a:latin typeface="Segoe UI" panose="020B0502040204020203" pitchFamily="34" charset="0"/>
-                <a:cs typeface="Segoe UI" panose="020B0502040204020203" pitchFamily="34" charset="0"/>
-              </a:rPr>
-              <a:t>. </a:t>
-            </a:r>
-          </a:p>
-          <a:p>
-            <a:pPr lvl="0">
-              <a:spcAft>
-                <a:spcPts val="600"/>
-              </a:spcAft>
-              <a:buFont typeface="+mj-lt"/>
-              <a:buAutoNum type="arabicPeriod"/>
-              <a:defRPr/>
-            </a:pPr>
-            <a:r>
-              <a:rPr lang="en-US" b="1" dirty="0">
-                <a:latin typeface="Segoe UI" panose="020B0502040204020203" pitchFamily="34" charset="0"/>
-                <a:cs typeface="Segoe UI" panose="020B0502040204020203" pitchFamily="34" charset="0"/>
-              </a:rPr>
-              <a:t>Review to discover errors</a:t>
-            </a:r>
-            <a:r>
-              <a:rPr lang="en-US" dirty="0">
-                <a:latin typeface="Segoe UI" panose="020B0502040204020203" pitchFamily="34" charset="0"/>
-                <a:cs typeface="Segoe UI" panose="020B0502040204020203" pitchFamily="34" charset="0"/>
-              </a:rPr>
-              <a:t> – </a:t>
-            </a:r>
-            <a:r>
-              <a:rPr lang="en-US" sz="1100" i="1" dirty="0">
-                <a:latin typeface="Segoe UI" panose="020B0502040204020203" pitchFamily="34" charset="0"/>
-                <a:cs typeface="Segoe UI" panose="020B0502040204020203" pitchFamily="34" charset="0"/>
-              </a:rPr>
-              <a:t>Review design timely to minimize errors</a:t>
-            </a:r>
-          </a:p>
-          <a:p>
-            <a:pPr lvl="0">
-              <a:spcAft>
-                <a:spcPts val="600"/>
-              </a:spcAft>
-              <a:buFont typeface="+mj-lt"/>
-              <a:buAutoNum type="arabicPeriod"/>
-              <a:defRPr/>
-            </a:pPr>
-            <a:r>
-              <a:rPr lang="en-US" b="1" dirty="0">
-                <a:latin typeface="Segoe UI" panose="020B0502040204020203" pitchFamily="34" charset="0"/>
-                <a:cs typeface="Segoe UI" panose="020B0502040204020203" pitchFamily="34" charset="0"/>
-              </a:rPr>
-              <a:t>Design is not coding and coding is not design</a:t>
-            </a:r>
-            <a:r>
-              <a:rPr lang="en-US" dirty="0">
-                <a:latin typeface="Segoe UI" panose="020B0502040204020203" pitchFamily="34" charset="0"/>
-                <a:cs typeface="Segoe UI" panose="020B0502040204020203" pitchFamily="34" charset="0"/>
-              </a:rPr>
-              <a:t> – </a:t>
-            </a:r>
-            <a:r>
-              <a:rPr lang="en-US" sz="1100" i="1" dirty="0">
-                <a:latin typeface="Segoe UI" panose="020B0502040204020203" pitchFamily="34" charset="0"/>
-                <a:cs typeface="Segoe UI" panose="020B0502040204020203" pitchFamily="34" charset="0"/>
-              </a:rPr>
-              <a:t>Design is describing the logic of program and coding is implementation of design</a:t>
-            </a:r>
           </a:p>
         </p:txBody>
       </p:sp>
@@ -7988,8 +8542,8 @@
         </p:blipFill>
         <p:spPr bwMode="auto">
           <a:xfrm>
-            <a:off x="6890159" y="1285571"/>
-            <a:ext cx="4976329" cy="3747824"/>
+            <a:off x="6483569" y="1285571"/>
+            <a:ext cx="5382919" cy="4067664"/>
           </a:xfrm>
           <a:prstGeom prst="rect">
             <a:avLst/>
@@ -8028,6 +8582,530 @@
 </file>
 
 <file path=ppt/slides/slide4.xml><?xml version="1.0" encoding="utf-8"?>
+<p:sld xmlns:a="http://schemas.openxmlformats.org/drawingml/2006/main" xmlns:r="http://schemas.openxmlformats.org/officeDocument/2006/relationships" xmlns:p="http://schemas.openxmlformats.org/presentationml/2006/main">
+  <p:cSld>
+    <p:spTree>
+      <p:nvGrpSpPr>
+        <p:cNvPr id="1" name=""/>
+        <p:cNvGrpSpPr/>
+        <p:nvPr/>
+      </p:nvGrpSpPr>
+      <p:grpSpPr>
+        <a:xfrm>
+          <a:off x="0" y="0"/>
+          <a:ext cx="0" cy="0"/>
+          <a:chOff x="0" y="0"/>
+          <a:chExt cx="0" cy="0"/>
+        </a:xfrm>
+      </p:grpSpPr>
+      <p:sp>
+        <p:nvSpPr>
+          <p:cNvPr id="8" name="Title 7"/>
+          <p:cNvSpPr>
+            <a:spLocks noGrp="1"/>
+          </p:cNvSpPr>
+          <p:nvPr>
+            <p:ph type="title"/>
+          </p:nvPr>
+        </p:nvSpPr>
+        <p:spPr>
+          <a:xfrm>
+            <a:off x="521207" y="448056"/>
+            <a:ext cx="7658059" cy="640080"/>
+          </a:xfrm>
+        </p:spPr>
+        <p:txBody>
+          <a:bodyPr>
+            <a:noAutofit/>
+          </a:bodyPr>
+          <a:lstStyle/>
+          <a:p>
+            <a:r>
+              <a:rPr lang="en-US" dirty="0">
+                <a:latin typeface="Segoe UI Light" panose="020B0502040204020203" pitchFamily="34" charset="0"/>
+                <a:cs typeface="Segoe UI Light" panose="020B0502040204020203" pitchFamily="34" charset="0"/>
+              </a:rPr>
+              <a:t>WHY NEED OF SOFTWARE DESIGN PRINCIPLES?</a:t>
+            </a:r>
+          </a:p>
+        </p:txBody>
+      </p:sp>
+      <p:sp>
+        <p:nvSpPr>
+          <p:cNvPr id="38" name="Content Placeholder 17"/>
+          <p:cNvSpPr txBox="1">
+            <a:spLocks/>
+          </p:cNvSpPr>
+          <p:nvPr/>
+        </p:nvSpPr>
+        <p:spPr>
+          <a:xfrm>
+            <a:off x="521205" y="1285570"/>
+            <a:ext cx="5574795" cy="5186486"/>
+          </a:xfrm>
+          <a:prstGeom prst="rect">
+            <a:avLst/>
+          </a:prstGeom>
+        </p:spPr>
+        <p:txBody>
+          <a:bodyPr vert="horz" lIns="91440" tIns="45720" rIns="91440" bIns="45720" rtlCol="0">
+            <a:normAutofit/>
+          </a:bodyPr>
+          <a:lstStyle>
+            <a:lvl1pPr marL="228600" indent="-228600" algn="l" defTabSz="914400" rtl="0" eaLnBrk="1" latinLnBrk="0" hangingPunct="1">
+              <a:lnSpc>
+                <a:spcPts val="1800"/>
+              </a:lnSpc>
+              <a:spcBef>
+                <a:spcPts val="1000"/>
+              </a:spcBef>
+              <a:spcAft>
+                <a:spcPts val="1000"/>
+              </a:spcAft>
+              <a:buFont typeface="Arial" panose="020B0604020202020204" pitchFamily="34" charset="0"/>
+              <a:buChar char="•"/>
+              <a:defRPr lang="en-US" sz="1200" kern="1200" smtClean="0">
+                <a:solidFill>
+                  <a:schemeClr val="tx1">
+                    <a:lumMod val="75000"/>
+                    <a:lumOff val="25000"/>
+                  </a:schemeClr>
+                </a:solidFill>
+                <a:latin typeface="+mn-lt"/>
+                <a:ea typeface="+mn-ea"/>
+                <a:cs typeface="+mn-cs"/>
+              </a:defRPr>
+            </a:lvl1pPr>
+            <a:lvl2pPr marL="685800" indent="-228600" algn="l" defTabSz="914400" rtl="0" eaLnBrk="1" latinLnBrk="0" hangingPunct="1">
+              <a:lnSpc>
+                <a:spcPts val="1800"/>
+              </a:lnSpc>
+              <a:spcBef>
+                <a:spcPts val="1000"/>
+              </a:spcBef>
+              <a:spcAft>
+                <a:spcPts val="1000"/>
+              </a:spcAft>
+              <a:buFont typeface="Arial" panose="020B0604020202020204" pitchFamily="34" charset="0"/>
+              <a:buChar char="•"/>
+              <a:defRPr lang="en-US" sz="1200" kern="1200" smtClean="0">
+                <a:solidFill>
+                  <a:schemeClr val="tx1">
+                    <a:lumMod val="75000"/>
+                    <a:lumOff val="25000"/>
+                  </a:schemeClr>
+                </a:solidFill>
+                <a:latin typeface="+mn-lt"/>
+                <a:ea typeface="+mn-ea"/>
+                <a:cs typeface="+mn-cs"/>
+              </a:defRPr>
+            </a:lvl2pPr>
+            <a:lvl3pPr marL="1143000" indent="-228600" algn="l" defTabSz="914400" rtl="0" eaLnBrk="1" latinLnBrk="0" hangingPunct="1">
+              <a:lnSpc>
+                <a:spcPts val="1800"/>
+              </a:lnSpc>
+              <a:spcBef>
+                <a:spcPts val="1000"/>
+              </a:spcBef>
+              <a:spcAft>
+                <a:spcPts val="1000"/>
+              </a:spcAft>
+              <a:buFont typeface="Arial" panose="020B0604020202020204" pitchFamily="34" charset="0"/>
+              <a:buChar char="•"/>
+              <a:defRPr lang="en-US" sz="1200" kern="1200" smtClean="0">
+                <a:solidFill>
+                  <a:schemeClr val="tx1">
+                    <a:lumMod val="75000"/>
+                    <a:lumOff val="25000"/>
+                  </a:schemeClr>
+                </a:solidFill>
+                <a:latin typeface="+mn-lt"/>
+                <a:ea typeface="+mn-ea"/>
+                <a:cs typeface="+mn-cs"/>
+              </a:defRPr>
+            </a:lvl3pPr>
+            <a:lvl4pPr marL="1600200" indent="-228600" algn="l" defTabSz="914400" rtl="0" eaLnBrk="1" latinLnBrk="0" hangingPunct="1">
+              <a:lnSpc>
+                <a:spcPts val="1800"/>
+              </a:lnSpc>
+              <a:spcBef>
+                <a:spcPts val="1000"/>
+              </a:spcBef>
+              <a:spcAft>
+                <a:spcPts val="1000"/>
+              </a:spcAft>
+              <a:buFont typeface="Arial" panose="020B0604020202020204" pitchFamily="34" charset="0"/>
+              <a:buChar char="•"/>
+              <a:defRPr lang="en-US" sz="1200" kern="1200" smtClean="0">
+                <a:solidFill>
+                  <a:schemeClr val="tx1">
+                    <a:lumMod val="75000"/>
+                    <a:lumOff val="25000"/>
+                  </a:schemeClr>
+                </a:solidFill>
+                <a:latin typeface="+mn-lt"/>
+                <a:ea typeface="+mn-ea"/>
+                <a:cs typeface="+mn-cs"/>
+              </a:defRPr>
+            </a:lvl4pPr>
+            <a:lvl5pPr marL="2057400" indent="-228600" algn="l" defTabSz="914400" rtl="0" eaLnBrk="1" latinLnBrk="0" hangingPunct="1">
+              <a:lnSpc>
+                <a:spcPts val="1800"/>
+              </a:lnSpc>
+              <a:spcBef>
+                <a:spcPts val="1000"/>
+              </a:spcBef>
+              <a:spcAft>
+                <a:spcPts val="1000"/>
+              </a:spcAft>
+              <a:buFont typeface="Arial" panose="020B0604020202020204" pitchFamily="34" charset="0"/>
+              <a:buChar char="•"/>
+              <a:defRPr lang="en-US" sz="1200" kern="1200">
+                <a:solidFill>
+                  <a:schemeClr val="tx1">
+                    <a:lumMod val="75000"/>
+                    <a:lumOff val="25000"/>
+                  </a:schemeClr>
+                </a:solidFill>
+                <a:latin typeface="+mn-lt"/>
+                <a:ea typeface="+mn-ea"/>
+                <a:cs typeface="+mn-cs"/>
+              </a:defRPr>
+            </a:lvl5pPr>
+            <a:lvl6pPr marL="2514600" indent="-228600" algn="l" defTabSz="914400" rtl="0" eaLnBrk="1" latinLnBrk="0" hangingPunct="1">
+              <a:lnSpc>
+                <a:spcPct val="90000"/>
+              </a:lnSpc>
+              <a:spcBef>
+                <a:spcPct val="30000"/>
+              </a:spcBef>
+              <a:buFont typeface="Arial" panose="020B0604020202020204" pitchFamily="34" charset="0"/>
+              <a:buChar char="•"/>
+              <a:defRPr sz="1800" kern="1200">
+                <a:solidFill>
+                  <a:schemeClr val="tx1"/>
+                </a:solidFill>
+                <a:latin typeface="+mn-lt"/>
+                <a:ea typeface="+mn-ea"/>
+                <a:cs typeface="+mn-cs"/>
+              </a:defRPr>
+            </a:lvl6pPr>
+            <a:lvl7pPr marL="2971800" indent="-228600" algn="l" defTabSz="914400" rtl="0" eaLnBrk="1" latinLnBrk="0" hangingPunct="1">
+              <a:lnSpc>
+                <a:spcPct val="90000"/>
+              </a:lnSpc>
+              <a:spcBef>
+                <a:spcPct val="30000"/>
+              </a:spcBef>
+              <a:buFont typeface="Arial" panose="020B0604020202020204" pitchFamily="34" charset="0"/>
+              <a:buChar char="•"/>
+              <a:defRPr sz="1800" kern="1200">
+                <a:solidFill>
+                  <a:schemeClr val="tx1"/>
+                </a:solidFill>
+                <a:latin typeface="+mn-lt"/>
+                <a:ea typeface="+mn-ea"/>
+                <a:cs typeface="+mn-cs"/>
+              </a:defRPr>
+            </a:lvl7pPr>
+            <a:lvl8pPr marL="3429000" indent="-228600" algn="l" defTabSz="914400" rtl="0" eaLnBrk="1" latinLnBrk="0" hangingPunct="1">
+              <a:lnSpc>
+                <a:spcPct val="90000"/>
+              </a:lnSpc>
+              <a:spcBef>
+                <a:spcPct val="30000"/>
+              </a:spcBef>
+              <a:buFont typeface="Arial" panose="020B0604020202020204" pitchFamily="34" charset="0"/>
+              <a:buChar char="•"/>
+              <a:defRPr sz="1800" kern="1200">
+                <a:solidFill>
+                  <a:schemeClr val="tx1"/>
+                </a:solidFill>
+                <a:latin typeface="+mn-lt"/>
+                <a:ea typeface="+mn-ea"/>
+                <a:cs typeface="+mn-cs"/>
+              </a:defRPr>
+            </a:lvl8pPr>
+            <a:lvl9pPr marL="3886200" indent="-228600" algn="l" defTabSz="914400" rtl="0" eaLnBrk="1" latinLnBrk="0" hangingPunct="1">
+              <a:lnSpc>
+                <a:spcPct val="90000"/>
+              </a:lnSpc>
+              <a:spcBef>
+                <a:spcPct val="30000"/>
+              </a:spcBef>
+              <a:buFont typeface="Arial" panose="020B0604020202020204" pitchFamily="34" charset="0"/>
+              <a:buChar char="•"/>
+              <a:defRPr sz="1800" kern="1200">
+                <a:solidFill>
+                  <a:schemeClr val="tx1"/>
+                </a:solidFill>
+                <a:latin typeface="+mn-lt"/>
+                <a:ea typeface="+mn-ea"/>
+                <a:cs typeface="+mn-cs"/>
+              </a:defRPr>
+            </a:lvl9pPr>
+          </a:lstStyle>
+          <a:p>
+            <a:pPr marL="0" lvl="0" indent="0">
+              <a:spcAft>
+                <a:spcPts val="600"/>
+              </a:spcAft>
+              <a:buNone/>
+              <a:defRPr/>
+            </a:pPr>
+            <a:endParaRPr lang="en-US" sz="1100" i="1" dirty="0">
+              <a:latin typeface="Segoe UI" panose="020B0502040204020203" pitchFamily="34" charset="0"/>
+              <a:cs typeface="Segoe UI" panose="020B0502040204020203" pitchFamily="34" charset="0"/>
+            </a:endParaRPr>
+          </a:p>
+          <a:p>
+            <a:pPr lvl="0">
+              <a:spcAft>
+                <a:spcPts val="600"/>
+              </a:spcAft>
+              <a:buFont typeface="+mj-lt"/>
+              <a:buAutoNum type="arabicPeriod" startAt="6"/>
+              <a:defRPr/>
+            </a:pPr>
+            <a:r>
+              <a:rPr lang="en-US" b="1" dirty="0">
+                <a:latin typeface="Segoe UI" panose="020B0502040204020203" pitchFamily="34" charset="0"/>
+                <a:cs typeface="Segoe UI" panose="020B0502040204020203" pitchFamily="34" charset="0"/>
+              </a:rPr>
+              <a:t>Accommodate change</a:t>
+            </a:r>
+            <a:r>
+              <a:rPr lang="en-US" dirty="0">
+                <a:latin typeface="Segoe UI" panose="020B0502040204020203" pitchFamily="34" charset="0"/>
+                <a:cs typeface="Segoe UI" panose="020B0502040204020203" pitchFamily="34" charset="0"/>
+              </a:rPr>
+              <a:t> – </a:t>
+            </a:r>
+            <a:r>
+              <a:rPr lang="en-US" sz="1100" i="1" dirty="0">
+                <a:latin typeface="Segoe UI" panose="020B0502040204020203" pitchFamily="34" charset="0"/>
+                <a:cs typeface="Segoe UI" panose="020B0502040204020203" pitchFamily="34" charset="0"/>
+              </a:rPr>
+              <a:t>Adjust the change as per user’s need</a:t>
+            </a:r>
+            <a:r>
+              <a:rPr lang="en-US" dirty="0">
+                <a:latin typeface="Segoe UI" panose="020B0502040204020203" pitchFamily="34" charset="0"/>
+                <a:cs typeface="Segoe UI" panose="020B0502040204020203" pitchFamily="34" charset="0"/>
+              </a:rPr>
+              <a:t>.</a:t>
+            </a:r>
+          </a:p>
+          <a:p>
+            <a:pPr lvl="0">
+              <a:spcAft>
+                <a:spcPts val="600"/>
+              </a:spcAft>
+              <a:buFont typeface="+mj-lt"/>
+              <a:buAutoNum type="arabicPeriod" startAt="6"/>
+              <a:defRPr/>
+            </a:pPr>
+            <a:r>
+              <a:rPr lang="en-US" b="1" dirty="0">
+                <a:latin typeface="Segoe UI" panose="020B0502040204020203" pitchFamily="34" charset="0"/>
+                <a:cs typeface="Segoe UI" panose="020B0502040204020203" pitchFamily="34" charset="0"/>
+              </a:rPr>
+              <a:t>Degrade gently</a:t>
+            </a:r>
+            <a:r>
+              <a:rPr lang="en-US" dirty="0">
+                <a:latin typeface="Segoe UI" panose="020B0502040204020203" pitchFamily="34" charset="0"/>
+                <a:cs typeface="Segoe UI" panose="020B0502040204020203" pitchFamily="34" charset="0"/>
+              </a:rPr>
+              <a:t> - </a:t>
+            </a:r>
+            <a:r>
+              <a:rPr lang="en-US" sz="1100" b="0" i="1" dirty="0">
+                <a:solidFill>
+                  <a:srgbClr val="273239"/>
+                </a:solidFill>
+                <a:effectLst/>
+                <a:latin typeface="Segoe UI" panose="020B0502040204020203" pitchFamily="34" charset="0"/>
+                <a:cs typeface="Segoe UI" panose="020B0502040204020203" pitchFamily="34" charset="0"/>
+              </a:rPr>
+              <a:t>Work properly even if an error occurs during the execution.</a:t>
+            </a:r>
+            <a:endParaRPr lang="en-US" sz="1100" i="1" dirty="0">
+              <a:latin typeface="Segoe UI" panose="020B0502040204020203" pitchFamily="34" charset="0"/>
+              <a:cs typeface="Segoe UI" panose="020B0502040204020203" pitchFamily="34" charset="0"/>
+            </a:endParaRPr>
+          </a:p>
+          <a:p>
+            <a:pPr lvl="0">
+              <a:spcAft>
+                <a:spcPts val="600"/>
+              </a:spcAft>
+              <a:buFont typeface="+mj-lt"/>
+              <a:buAutoNum type="arabicPeriod" startAt="6"/>
+              <a:defRPr/>
+            </a:pPr>
+            <a:r>
+              <a:rPr lang="en-US" b="1" dirty="0">
+                <a:latin typeface="Segoe UI" panose="020B0502040204020203" pitchFamily="34" charset="0"/>
+                <a:cs typeface="Segoe UI" panose="020B0502040204020203" pitchFamily="34" charset="0"/>
+              </a:rPr>
+              <a:t>Assessed for quality</a:t>
+            </a:r>
+            <a:r>
+              <a:rPr lang="en-US" dirty="0">
+                <a:latin typeface="Segoe UI" panose="020B0502040204020203" pitchFamily="34" charset="0"/>
+                <a:cs typeface="Segoe UI" panose="020B0502040204020203" pitchFamily="34" charset="0"/>
+              </a:rPr>
+              <a:t> - </a:t>
+            </a:r>
+            <a:r>
+              <a:rPr lang="en-US" sz="1100" i="1" dirty="0">
+                <a:latin typeface="Segoe UI" panose="020B0502040204020203" pitchFamily="34" charset="0"/>
+                <a:cs typeface="Segoe UI" panose="020B0502040204020203" pitchFamily="34" charset="0"/>
+              </a:rPr>
+              <a:t>The quality of the design needs to be checked and focused</a:t>
+            </a:r>
+            <a:r>
+              <a:rPr lang="en-US" dirty="0">
+                <a:latin typeface="Segoe UI" panose="020B0502040204020203" pitchFamily="34" charset="0"/>
+                <a:cs typeface="Segoe UI" panose="020B0502040204020203" pitchFamily="34" charset="0"/>
+              </a:rPr>
+              <a:t>. </a:t>
+            </a:r>
+          </a:p>
+          <a:p>
+            <a:pPr lvl="0">
+              <a:spcAft>
+                <a:spcPts val="600"/>
+              </a:spcAft>
+              <a:buFont typeface="+mj-lt"/>
+              <a:buAutoNum type="arabicPeriod" startAt="6"/>
+              <a:defRPr/>
+            </a:pPr>
+            <a:r>
+              <a:rPr lang="en-US" b="1" dirty="0">
+                <a:latin typeface="Segoe UI" panose="020B0502040204020203" pitchFamily="34" charset="0"/>
+                <a:cs typeface="Segoe UI" panose="020B0502040204020203" pitchFamily="34" charset="0"/>
+              </a:rPr>
+              <a:t>Review to discover errors</a:t>
+            </a:r>
+            <a:r>
+              <a:rPr lang="en-US" dirty="0">
+                <a:latin typeface="Segoe UI" panose="020B0502040204020203" pitchFamily="34" charset="0"/>
+                <a:cs typeface="Segoe UI" panose="020B0502040204020203" pitchFamily="34" charset="0"/>
+              </a:rPr>
+              <a:t> – </a:t>
+            </a:r>
+            <a:r>
+              <a:rPr lang="en-US" sz="1100" i="1" dirty="0">
+                <a:latin typeface="Segoe UI" panose="020B0502040204020203" pitchFamily="34" charset="0"/>
+                <a:cs typeface="Segoe UI" panose="020B0502040204020203" pitchFamily="34" charset="0"/>
+              </a:rPr>
+              <a:t>Review design timely to minimize errors</a:t>
+            </a:r>
+          </a:p>
+          <a:p>
+            <a:pPr lvl="0">
+              <a:spcAft>
+                <a:spcPts val="600"/>
+              </a:spcAft>
+              <a:buFont typeface="+mj-lt"/>
+              <a:buAutoNum type="arabicPeriod" startAt="6"/>
+              <a:defRPr/>
+            </a:pPr>
+            <a:r>
+              <a:rPr lang="en-US" b="1" dirty="0">
+                <a:latin typeface="Segoe UI" panose="020B0502040204020203" pitchFamily="34" charset="0"/>
+                <a:cs typeface="Segoe UI" panose="020B0502040204020203" pitchFamily="34" charset="0"/>
+              </a:rPr>
+              <a:t>Design is not coding and coding is not design</a:t>
+            </a:r>
+            <a:r>
+              <a:rPr lang="en-US" dirty="0">
+                <a:latin typeface="Segoe UI" panose="020B0502040204020203" pitchFamily="34" charset="0"/>
+                <a:cs typeface="Segoe UI" panose="020B0502040204020203" pitchFamily="34" charset="0"/>
+              </a:rPr>
+              <a:t> – </a:t>
+            </a:r>
+            <a:r>
+              <a:rPr lang="en-US" sz="1100" i="1" dirty="0">
+                <a:latin typeface="Segoe UI" panose="020B0502040204020203" pitchFamily="34" charset="0"/>
+                <a:cs typeface="Segoe UI" panose="020B0502040204020203" pitchFamily="34" charset="0"/>
+              </a:rPr>
+              <a:t>Design is describing the logic of program and coding is implementation of design</a:t>
+            </a:r>
+          </a:p>
+        </p:txBody>
+      </p:sp>
+      <p:pic>
+        <p:nvPicPr>
+          <p:cNvPr id="1026" name="Picture 2" descr="Lightbox">
+            <a:extLst>
+              <a:ext uri="{FF2B5EF4-FFF2-40B4-BE49-F238E27FC236}">
+                <a16:creationId xmlns:a16="http://schemas.microsoft.com/office/drawing/2014/main" id="{EDF378AB-CCB3-D0C0-362A-7750EFCD2327}"/>
+              </a:ext>
+            </a:extLst>
+          </p:cNvPr>
+          <p:cNvPicPr>
+            <a:picLocks noChangeAspect="1" noChangeArrowheads="1"/>
+          </p:cNvPicPr>
+          <p:nvPr/>
+        </p:nvPicPr>
+        <p:blipFill>
+          <a:blip r:embed="rId2">
+            <a:extLst>
+              <a:ext uri="{28A0092B-C50C-407E-A947-70E740481C1C}">
+                <a14:useLocalDpi xmlns:a14="http://schemas.microsoft.com/office/drawing/2010/main" val="0"/>
+              </a:ext>
+            </a:extLst>
+          </a:blip>
+          <a:srcRect/>
+          <a:stretch>
+            <a:fillRect/>
+          </a:stretch>
+        </p:blipFill>
+        <p:spPr bwMode="auto">
+          <a:xfrm>
+            <a:off x="6335815" y="1285571"/>
+            <a:ext cx="5530674" cy="4165318"/>
+          </a:xfrm>
+          <a:prstGeom prst="rect">
+            <a:avLst/>
+          </a:prstGeom>
+          <a:noFill/>
+          <a:extLst>
+            <a:ext uri="{909E8E84-426E-40DD-AFC4-6F175D3DCCD1}">
+              <a14:hiddenFill xmlns:a14="http://schemas.microsoft.com/office/drawing/2010/main">
+                <a:solidFill>
+                  <a:srgbClr val="FFFFFF"/>
+                </a:solidFill>
+              </a14:hiddenFill>
+            </a:ext>
+          </a:extLst>
+        </p:spPr>
+      </p:pic>
+    </p:spTree>
+    <p:extLst>
+      <p:ext uri="{BB962C8B-B14F-4D97-AF65-F5344CB8AC3E}">
+        <p14:creationId xmlns:p14="http://schemas.microsoft.com/office/powerpoint/2010/main" val="2609524556"/>
+      </p:ext>
+    </p:extLst>
+  </p:cSld>
+  <p:clrMapOvr>
+    <a:masterClrMapping/>
+  </p:clrMapOvr>
+  <mc:AlternateContent xmlns:mc="http://schemas.openxmlformats.org/markup-compatibility/2006" xmlns:p14="http://schemas.microsoft.com/office/powerpoint/2010/main">
+    <mc:Choice Requires="p14">
+      <p:transition p14:dur="10"/>
+    </mc:Choice>
+    <mc:Fallback xmlns="">
+      <p:transition/>
+    </mc:Fallback>
+  </mc:AlternateContent>
+</p:sld>
+</file>
+
+<file path=ppt/slides/slide5.xml><?xml version="1.0" encoding="utf-8"?>
 <p:sld xmlns:a="http://schemas.openxmlformats.org/drawingml/2006/main" xmlns:r="http://schemas.openxmlformats.org/officeDocument/2006/relationships" xmlns:p="http://schemas.openxmlformats.org/presentationml/2006/main">
   <p:cSld>
     <p:spTree>
@@ -8154,7 +9232,7 @@
           <a:effectLst/>
           <a:extLst>
             <a:ext uri="{C572A759-6A51-4108-AA02-DFA0A04FC94B}">
-              <ma14:wrappingTextBoxFlag xmlns:ma14="http://schemas.microsoft.com/office/mac/drawingml/2011/main" xmlns=""/>
+              <ma14:wrappingTextBoxFlag xmlns="" xmlns:ma14="http://schemas.microsoft.com/office/mac/drawingml/2011/main"/>
             </a:ext>
           </a:extLst>
         </p:spPr>
@@ -8179,7 +9257,7 @@
               </a:tabLst>
             </a:pPr>
             <a:r>
-              <a:rPr lang="en-US" sz="1200" b="1" kern="1000" spc="100" dirty="0">
+              <a:rPr lang="en-US" sz="2000" b="1" kern="1000" spc="100" dirty="0">
                 <a:solidFill>
                   <a:srgbClr val="D24726"/>
                 </a:solidFill>
@@ -8189,7 +9267,7 @@
               </a:rPr>
               <a:t>You are boring </a:t>
             </a:r>
-            <a:endParaRPr lang="en-US" sz="1200" b="1" kern="1400" dirty="0">
+            <a:endParaRPr lang="en-US" sz="2000" b="1" kern="1400" dirty="0">
               <a:solidFill>
                 <a:srgbClr val="D24726"/>
               </a:solidFill>
@@ -8222,7 +9300,7 @@
 </p:sld>
 </file>
 
-<file path=ppt/slides/slide5.xml><?xml version="1.0" encoding="utf-8"?>
+<file path=ppt/slides/slide6.xml><?xml version="1.0" encoding="utf-8"?>
 <p:sld xmlns:a="http://schemas.openxmlformats.org/drawingml/2006/main" xmlns:r="http://schemas.openxmlformats.org/officeDocument/2006/relationships" xmlns:p="http://schemas.openxmlformats.org/presentationml/2006/main">
   <p:cSld>
     <p:spTree>
@@ -8272,8 +9350,8 @@
         </p:nvSpPr>
         <p:spPr>
           <a:xfrm rot="21077122">
-            <a:off x="5355025" y="1653218"/>
-            <a:ext cx="1334770" cy="435610"/>
+            <a:off x="4992984" y="1534155"/>
+            <a:ext cx="2386114" cy="435610"/>
           </a:xfrm>
           <a:prstGeom prst="rect">
             <a:avLst/>
@@ -8285,7 +9363,7 @@
           <a:effectLst/>
           <a:extLst>
             <a:ext uri="{C572A759-6A51-4108-AA02-DFA0A04FC94B}">
-              <ma14:wrappingTextBoxFlag xmlns:ma14="http://schemas.microsoft.com/office/mac/drawingml/2011/main" xmlns=""/>
+              <ma14:wrappingTextBoxFlag xmlns="" xmlns:ma14="http://schemas.microsoft.com/office/mac/drawingml/2011/main"/>
             </a:ext>
           </a:extLst>
         </p:spPr>
@@ -8310,7 +9388,7 @@
               </a:tabLst>
             </a:pPr>
             <a:r>
-              <a:rPr lang="en-US" sz="1200" b="1" kern="1000" spc="100" dirty="0">
+              <a:rPr lang="en-US" sz="2000" b="1" kern="1000" spc="100" dirty="0">
                 <a:ln>
                   <a:noFill/>
                 </a:ln>
@@ -8324,7 +9402,7 @@
               </a:rPr>
               <a:t>Not Interested</a:t>
             </a:r>
-            <a:endParaRPr lang="en-US" sz="1200" b="1" kern="1400" dirty="0">
+            <a:endParaRPr lang="en-US" sz="2000" b="1" kern="1400" dirty="0">
               <a:solidFill>
                 <a:srgbClr val="D24726"/>
               </a:solidFill>
@@ -8626,12 +9704,22 @@
             <a:r>
               <a:rPr lang="en-US" sz="1100" dirty="0">
                 <a:solidFill>
-                  <a:schemeClr val="accent2"/>
+                  <a:schemeClr val="accent4"/>
                 </a:solidFill>
                 <a:latin typeface="Segoe UI" panose="020B0502040204020203" pitchFamily="34" charset="0"/>
                 <a:cs typeface="Segoe UI" panose="020B0502040204020203" pitchFamily="34" charset="0"/>
               </a:rPr>
-              <a:t>Definition :</a:t>
+              <a:t>Definition</a:t>
+            </a:r>
+            <a:r>
+              <a:rPr lang="en-US" sz="1100" dirty="0">
+                <a:solidFill>
+                  <a:schemeClr val="accent2"/>
+                </a:solidFill>
+                <a:latin typeface="Segoe UI" panose="020B0502040204020203" pitchFamily="34" charset="0"/>
+                <a:cs typeface="Segoe UI" panose="020B0502040204020203" pitchFamily="34" charset="0"/>
+              </a:rPr>
+              <a:t> :</a:t>
             </a:r>
           </a:p>
           <a:p>
@@ -8647,7 +9735,7 @@
                 <a:latin typeface="Segoe UI" panose="020B0502040204020203" pitchFamily="34" charset="0"/>
                 <a:cs typeface="Segoe UI" panose="020B0502040204020203" pitchFamily="34" charset="0"/>
               </a:rPr>
-              <a:t>Design functionality to deliver below responsibilities,</a:t>
+              <a:t>Design class to deliver below responsibilities,</a:t>
             </a:r>
           </a:p>
           <a:p>
@@ -8699,6 +9787,42 @@
                 <a:cs typeface="Segoe UI" panose="020B0502040204020203" pitchFamily="34" charset="0"/>
               </a:rPr>
               <a:t>Print Report</a:t>
+            </a:r>
+          </a:p>
+          <a:p>
+            <a:pPr marL="0" lvl="0" indent="0">
+              <a:spcAft>
+                <a:spcPts val="600"/>
+              </a:spcAft>
+              <a:buNone/>
+              <a:defRPr/>
+            </a:pPr>
+            <a:r>
+              <a:rPr lang="en-US" sz="1100" dirty="0">
+                <a:solidFill>
+                  <a:schemeClr val="accent4"/>
+                </a:solidFill>
+                <a:latin typeface="Segoe UI" panose="020B0502040204020203" pitchFamily="34" charset="0"/>
+                <a:cs typeface="Segoe UI" panose="020B0502040204020203" pitchFamily="34" charset="0"/>
+              </a:rPr>
+              <a:t>Review:</a:t>
+            </a:r>
+          </a:p>
+          <a:p>
+            <a:pPr lvl="0">
+              <a:spcAft>
+                <a:spcPts val="600"/>
+              </a:spcAft>
+              <a:buFontTx/>
+              <a:buChar char="-"/>
+              <a:defRPr/>
+            </a:pPr>
+            <a:r>
+              <a:rPr lang="en-US" sz="1100" dirty="0">
+                <a:latin typeface="Segoe UI" panose="020B0502040204020203" pitchFamily="34" charset="0"/>
+                <a:cs typeface="Segoe UI" panose="020B0502040204020203" pitchFamily="34" charset="0"/>
+              </a:rPr>
+              <a:t>Keep it with you, Review yourself after the session.</a:t>
             </a:r>
           </a:p>
           <a:p>
@@ -8750,7 +9874,7 @@
 </p:sld>
 </file>
 
-<file path=ppt/slides/slide6.xml><?xml version="1.0" encoding="utf-8"?>
+<file path=ppt/slides/slide7.xml><?xml version="1.0" encoding="utf-8"?>
 <p:sld xmlns:a="http://schemas.openxmlformats.org/drawingml/2006/main" xmlns:r="http://schemas.openxmlformats.org/officeDocument/2006/relationships" xmlns:p="http://schemas.openxmlformats.org/presentationml/2006/main">
   <p:cSld>
     <p:spTree>
@@ -9109,7 +10233,7 @@
         </p:blipFill>
         <p:spPr>
           <a:xfrm>
-            <a:off x="640228" y="2563973"/>
+            <a:off x="521205" y="3238784"/>
             <a:ext cx="4945066" cy="1280058"/>
           </a:xfrm>
           <a:prstGeom prst="rect">
@@ -9147,166 +10271,6 @@
           </a:prstGeom>
         </p:spPr>
       </p:pic>
-      <p:pic>
-        <p:nvPicPr>
-          <p:cNvPr id="7" name="Picture 6">
-            <a:extLst>
-              <a:ext uri="{FF2B5EF4-FFF2-40B4-BE49-F238E27FC236}">
-                <a16:creationId xmlns:a16="http://schemas.microsoft.com/office/drawing/2014/main" id="{729F5820-6B25-E9B0-AD81-133FA6ACE84A}"/>
-              </a:ext>
-            </a:extLst>
-          </p:cNvPr>
-          <p:cNvPicPr>
-            <a:picLocks noChangeAspect="1"/>
-          </p:cNvPicPr>
-          <p:nvPr/>
-        </p:nvPicPr>
-        <p:blipFill>
-          <a:blip r:embed="rId4"/>
-          <a:stretch>
-            <a:fillRect/>
-          </a:stretch>
-        </p:blipFill>
-        <p:spPr>
-          <a:xfrm>
-            <a:off x="489424" y="4530225"/>
-            <a:ext cx="5394711" cy="175616"/>
-          </a:xfrm>
-          <a:prstGeom prst="rect">
-            <a:avLst/>
-          </a:prstGeom>
-        </p:spPr>
-      </p:pic>
-      <p:pic>
-        <p:nvPicPr>
-          <p:cNvPr id="12" name="Picture 11">
-            <a:extLst>
-              <a:ext uri="{FF2B5EF4-FFF2-40B4-BE49-F238E27FC236}">
-                <a16:creationId xmlns:a16="http://schemas.microsoft.com/office/drawing/2014/main" id="{A4A98DE0-07DC-E5FC-9894-6A058AE7ACC7}"/>
-              </a:ext>
-            </a:extLst>
-          </p:cNvPr>
-          <p:cNvPicPr>
-            <a:picLocks noChangeAspect="1"/>
-          </p:cNvPicPr>
-          <p:nvPr/>
-        </p:nvPicPr>
-        <p:blipFill>
-          <a:blip r:embed="rId5"/>
-          <a:stretch>
-            <a:fillRect/>
-          </a:stretch>
-        </p:blipFill>
-        <p:spPr>
-          <a:xfrm>
-            <a:off x="532051" y="5668849"/>
-            <a:ext cx="5352084" cy="153267"/>
-          </a:xfrm>
-          <a:prstGeom prst="rect">
-            <a:avLst/>
-          </a:prstGeom>
-        </p:spPr>
-      </p:pic>
-      <p:sp>
-        <p:nvSpPr>
-          <p:cNvPr id="13" name="Oval 12">
-            <a:extLst>
-              <a:ext uri="{FF2B5EF4-FFF2-40B4-BE49-F238E27FC236}">
-                <a16:creationId xmlns:a16="http://schemas.microsoft.com/office/drawing/2014/main" id="{CD93DDBD-17FB-CC61-1139-C8457A7DA876}"/>
-              </a:ext>
-            </a:extLst>
-          </p:cNvPr>
-          <p:cNvSpPr/>
-          <p:nvPr/>
-        </p:nvSpPr>
-        <p:spPr>
-          <a:xfrm>
-            <a:off x="1615734" y="4075353"/>
-            <a:ext cx="2539013" cy="292964"/>
-          </a:xfrm>
-          <a:prstGeom prst="ellipse">
-            <a:avLst/>
-          </a:prstGeom>
-        </p:spPr>
-        <p:style>
-          <a:lnRef idx="2">
-            <a:schemeClr val="accent1">
-              <a:shade val="50000"/>
-            </a:schemeClr>
-          </a:lnRef>
-          <a:fillRef idx="1">
-            <a:schemeClr val="accent1"/>
-          </a:fillRef>
-          <a:effectRef idx="0">
-            <a:schemeClr val="accent1"/>
-          </a:effectRef>
-          <a:fontRef idx="minor">
-            <a:schemeClr val="lt1"/>
-          </a:fontRef>
-        </p:style>
-        <p:txBody>
-          <a:bodyPr rtlCol="0" anchor="ctr"/>
-          <a:lstStyle/>
-          <a:p>
-            <a:pPr algn="ctr"/>
-            <a:r>
-              <a:rPr lang="en-US" dirty="0"/>
-              <a:t>Before Change</a:t>
-            </a:r>
-            <a:endParaRPr lang="en-IN" dirty="0"/>
-          </a:p>
-        </p:txBody>
-      </p:sp>
-      <p:sp>
-        <p:nvSpPr>
-          <p:cNvPr id="15" name="Oval 14">
-            <a:extLst>
-              <a:ext uri="{FF2B5EF4-FFF2-40B4-BE49-F238E27FC236}">
-                <a16:creationId xmlns:a16="http://schemas.microsoft.com/office/drawing/2014/main" id="{03B3D154-D33A-E8D5-0436-51C516D87EEB}"/>
-              </a:ext>
-            </a:extLst>
-          </p:cNvPr>
-          <p:cNvSpPr/>
-          <p:nvPr/>
-        </p:nvSpPr>
-        <p:spPr>
-          <a:xfrm>
-            <a:off x="1615733" y="5173386"/>
-            <a:ext cx="2539013" cy="292964"/>
-          </a:xfrm>
-          <a:prstGeom prst="ellipse">
-            <a:avLst/>
-          </a:prstGeom>
-        </p:spPr>
-        <p:style>
-          <a:lnRef idx="2">
-            <a:schemeClr val="accent1">
-              <a:shade val="50000"/>
-            </a:schemeClr>
-          </a:lnRef>
-          <a:fillRef idx="1">
-            <a:schemeClr val="accent1"/>
-          </a:fillRef>
-          <a:effectRef idx="0">
-            <a:schemeClr val="accent1"/>
-          </a:effectRef>
-          <a:fontRef idx="minor">
-            <a:schemeClr val="lt1"/>
-          </a:fontRef>
-        </p:style>
-        <p:txBody>
-          <a:bodyPr rtlCol="0" anchor="ctr"/>
-          <a:lstStyle/>
-          <a:p>
-            <a:pPr algn="ctr"/>
-            <a:r>
-              <a:rPr lang="en-US" dirty="0"/>
-              <a:t>After Change</a:t>
-            </a:r>
-            <a:endParaRPr lang="en-IN" dirty="0"/>
-          </a:p>
-        </p:txBody>
-      </p:sp>
     </p:spTree>
     <p:extLst>
       <p:ext uri="{BB962C8B-B14F-4D97-AF65-F5344CB8AC3E}">
@@ -9328,7 +10292,7 @@
 </p:sld>
 </file>
 
-<file path=ppt/slides/slide7.xml><?xml version="1.0" encoding="utf-8"?>
+<file path=ppt/slides/slide8.xml><?xml version="1.0" encoding="utf-8"?>
 <p:sld xmlns:a="http://schemas.openxmlformats.org/drawingml/2006/main" xmlns:r="http://schemas.openxmlformats.org/officeDocument/2006/relationships" xmlns:p="http://schemas.openxmlformats.org/presentationml/2006/main">
   <p:cSld>
     <p:spTree>
@@ -9749,7 +10713,7 @@
 </p:sld>
 </file>
 
-<file path=ppt/slides/slide8.xml><?xml version="1.0" encoding="utf-8"?>
+<file path=ppt/slides/slide9.xml><?xml version="1.0" encoding="utf-8"?>
 <p:sld xmlns:a="http://schemas.openxmlformats.org/drawingml/2006/main" xmlns:r="http://schemas.openxmlformats.org/officeDocument/2006/relationships" xmlns:p="http://schemas.openxmlformats.org/presentationml/2006/main">
   <p:cSld>
     <p:spTree>
@@ -11971,575 +12935,6 @@
       <p:transition/>
     </mc:Fallback>
   </mc:AlternateContent>
-</p:sld>
-</file>
-
-<file path=ppt/slides/slide9.xml><?xml version="1.0" encoding="utf-8"?>
-<p:sld xmlns:a="http://schemas.openxmlformats.org/drawingml/2006/main" xmlns:r="http://schemas.openxmlformats.org/officeDocument/2006/relationships" xmlns:p="http://schemas.openxmlformats.org/presentationml/2006/main">
-  <p:cSld>
-    <p:spTree>
-      <p:nvGrpSpPr>
-        <p:cNvPr id="1" name=""/>
-        <p:cNvGrpSpPr/>
-        <p:nvPr/>
-      </p:nvGrpSpPr>
-      <p:grpSpPr>
-        <a:xfrm>
-          <a:off x="0" y="0"/>
-          <a:ext cx="0" cy="0"/>
-          <a:chOff x="0" y="0"/>
-          <a:chExt cx="0" cy="0"/>
-        </a:xfrm>
-      </p:grpSpPr>
-      <p:sp>
-        <p:nvSpPr>
-          <p:cNvPr id="3" name="Title 2"/>
-          <p:cNvSpPr>
-            <a:spLocks noGrp="1"/>
-          </p:cNvSpPr>
-          <p:nvPr>
-            <p:ph type="title"/>
-          </p:nvPr>
-        </p:nvSpPr>
-        <p:spPr/>
-        <p:txBody>
-          <a:bodyPr/>
-          <a:lstStyle/>
-          <a:p>
-            <a:r>
-              <a:rPr lang="en-US" dirty="0"/>
-              <a:t>SINGLE RESPONSIBILITY PRINCIPLE</a:t>
-            </a:r>
-            <a:endParaRPr lang="en-US" dirty="0">
-              <a:latin typeface="Segoe UI Light" panose="020B0502040204020203" pitchFamily="34" charset="0"/>
-              <a:cs typeface="Segoe UI Light" panose="020B0502040204020203" pitchFamily="34" charset="0"/>
-            </a:endParaRPr>
-          </a:p>
-        </p:txBody>
-      </p:sp>
-      <p:sp>
-        <p:nvSpPr>
-          <p:cNvPr id="31" name="Content Placeholder 17">
-            <a:extLst>
-              <a:ext uri="{FF2B5EF4-FFF2-40B4-BE49-F238E27FC236}">
-                <a16:creationId xmlns:a16="http://schemas.microsoft.com/office/drawing/2014/main" id="{ACECB700-9D9A-2026-DCE3-74DEC3C8D1B0}"/>
-              </a:ext>
-            </a:extLst>
-          </p:cNvPr>
-          <p:cNvSpPr txBox="1">
-            <a:spLocks/>
-          </p:cNvSpPr>
-          <p:nvPr/>
-        </p:nvSpPr>
-        <p:spPr>
-          <a:xfrm>
-            <a:off x="604344" y="1339746"/>
-            <a:ext cx="4806555" cy="5178500"/>
-          </a:xfrm>
-          <a:prstGeom prst="rect">
-            <a:avLst/>
-          </a:prstGeom>
-        </p:spPr>
-        <p:txBody>
-          <a:bodyPr vert="horz" lIns="91440" tIns="45720" rIns="91440" bIns="45720" rtlCol="0">
-            <a:normAutofit/>
-          </a:bodyPr>
-          <a:lstStyle>
-            <a:lvl1pPr marL="228600" indent="-228600" algn="l" defTabSz="914400" rtl="0" eaLnBrk="1" latinLnBrk="0" hangingPunct="1">
-              <a:lnSpc>
-                <a:spcPts val="1800"/>
-              </a:lnSpc>
-              <a:spcBef>
-                <a:spcPts val="1000"/>
-              </a:spcBef>
-              <a:spcAft>
-                <a:spcPts val="1000"/>
-              </a:spcAft>
-              <a:buFont typeface="Arial" panose="020B0604020202020204" pitchFamily="34" charset="0"/>
-              <a:buChar char="•"/>
-              <a:defRPr lang="en-US" sz="1200" kern="1200" smtClean="0">
-                <a:solidFill>
-                  <a:schemeClr val="tx1">
-                    <a:lumMod val="75000"/>
-                    <a:lumOff val="25000"/>
-                  </a:schemeClr>
-                </a:solidFill>
-                <a:latin typeface="+mn-lt"/>
-                <a:ea typeface="+mn-ea"/>
-                <a:cs typeface="+mn-cs"/>
-              </a:defRPr>
-            </a:lvl1pPr>
-            <a:lvl2pPr marL="685800" indent="-228600" algn="l" defTabSz="914400" rtl="0" eaLnBrk="1" latinLnBrk="0" hangingPunct="1">
-              <a:lnSpc>
-                <a:spcPts val="1800"/>
-              </a:lnSpc>
-              <a:spcBef>
-                <a:spcPts val="1000"/>
-              </a:spcBef>
-              <a:spcAft>
-                <a:spcPts val="1000"/>
-              </a:spcAft>
-              <a:buFont typeface="Arial" panose="020B0604020202020204" pitchFamily="34" charset="0"/>
-              <a:buChar char="•"/>
-              <a:defRPr lang="en-US" sz="1200" kern="1200" smtClean="0">
-                <a:solidFill>
-                  <a:schemeClr val="tx1">
-                    <a:lumMod val="75000"/>
-                    <a:lumOff val="25000"/>
-                  </a:schemeClr>
-                </a:solidFill>
-                <a:latin typeface="+mn-lt"/>
-                <a:ea typeface="+mn-ea"/>
-                <a:cs typeface="+mn-cs"/>
-              </a:defRPr>
-            </a:lvl2pPr>
-            <a:lvl3pPr marL="1143000" indent="-228600" algn="l" defTabSz="914400" rtl="0" eaLnBrk="1" latinLnBrk="0" hangingPunct="1">
-              <a:lnSpc>
-                <a:spcPts val="1800"/>
-              </a:lnSpc>
-              <a:spcBef>
-                <a:spcPts val="1000"/>
-              </a:spcBef>
-              <a:spcAft>
-                <a:spcPts val="1000"/>
-              </a:spcAft>
-              <a:buFont typeface="Arial" panose="020B0604020202020204" pitchFamily="34" charset="0"/>
-              <a:buChar char="•"/>
-              <a:defRPr lang="en-US" sz="1200" kern="1200" smtClean="0">
-                <a:solidFill>
-                  <a:schemeClr val="tx1">
-                    <a:lumMod val="75000"/>
-                    <a:lumOff val="25000"/>
-                  </a:schemeClr>
-                </a:solidFill>
-                <a:latin typeface="+mn-lt"/>
-                <a:ea typeface="+mn-ea"/>
-                <a:cs typeface="+mn-cs"/>
-              </a:defRPr>
-            </a:lvl3pPr>
-            <a:lvl4pPr marL="1600200" indent="-228600" algn="l" defTabSz="914400" rtl="0" eaLnBrk="1" latinLnBrk="0" hangingPunct="1">
-              <a:lnSpc>
-                <a:spcPts val="1800"/>
-              </a:lnSpc>
-              <a:spcBef>
-                <a:spcPts val="1000"/>
-              </a:spcBef>
-              <a:spcAft>
-                <a:spcPts val="1000"/>
-              </a:spcAft>
-              <a:buFont typeface="Arial" panose="020B0604020202020204" pitchFamily="34" charset="0"/>
-              <a:buChar char="•"/>
-              <a:defRPr lang="en-US" sz="1200" kern="1200" smtClean="0">
-                <a:solidFill>
-                  <a:schemeClr val="tx1">
-                    <a:lumMod val="75000"/>
-                    <a:lumOff val="25000"/>
-                  </a:schemeClr>
-                </a:solidFill>
-                <a:latin typeface="+mn-lt"/>
-                <a:ea typeface="+mn-ea"/>
-                <a:cs typeface="+mn-cs"/>
-              </a:defRPr>
-            </a:lvl4pPr>
-            <a:lvl5pPr marL="2057400" indent="-228600" algn="l" defTabSz="914400" rtl="0" eaLnBrk="1" latinLnBrk="0" hangingPunct="1">
-              <a:lnSpc>
-                <a:spcPts val="1800"/>
-              </a:lnSpc>
-              <a:spcBef>
-                <a:spcPts val="1000"/>
-              </a:spcBef>
-              <a:spcAft>
-                <a:spcPts val="1000"/>
-              </a:spcAft>
-              <a:buFont typeface="Arial" panose="020B0604020202020204" pitchFamily="34" charset="0"/>
-              <a:buChar char="•"/>
-              <a:defRPr lang="en-US" sz="1200" kern="1200">
-                <a:solidFill>
-                  <a:schemeClr val="tx1">
-                    <a:lumMod val="75000"/>
-                    <a:lumOff val="25000"/>
-                  </a:schemeClr>
-                </a:solidFill>
-                <a:latin typeface="+mn-lt"/>
-                <a:ea typeface="+mn-ea"/>
-                <a:cs typeface="+mn-cs"/>
-              </a:defRPr>
-            </a:lvl5pPr>
-            <a:lvl6pPr marL="2514600" indent="-228600" algn="l" defTabSz="914400" rtl="0" eaLnBrk="1" latinLnBrk="0" hangingPunct="1">
-              <a:lnSpc>
-                <a:spcPct val="90000"/>
-              </a:lnSpc>
-              <a:spcBef>
-                <a:spcPct val="30000"/>
-              </a:spcBef>
-              <a:buFont typeface="Arial" panose="020B0604020202020204" pitchFamily="34" charset="0"/>
-              <a:buChar char="•"/>
-              <a:defRPr sz="1800" kern="1200">
-                <a:solidFill>
-                  <a:schemeClr val="tx1"/>
-                </a:solidFill>
-                <a:latin typeface="+mn-lt"/>
-                <a:ea typeface="+mn-ea"/>
-                <a:cs typeface="+mn-cs"/>
-              </a:defRPr>
-            </a:lvl6pPr>
-            <a:lvl7pPr marL="2971800" indent="-228600" algn="l" defTabSz="914400" rtl="0" eaLnBrk="1" latinLnBrk="0" hangingPunct="1">
-              <a:lnSpc>
-                <a:spcPct val="90000"/>
-              </a:lnSpc>
-              <a:spcBef>
-                <a:spcPct val="30000"/>
-              </a:spcBef>
-              <a:buFont typeface="Arial" panose="020B0604020202020204" pitchFamily="34" charset="0"/>
-              <a:buChar char="•"/>
-              <a:defRPr sz="1800" kern="1200">
-                <a:solidFill>
-                  <a:schemeClr val="tx1"/>
-                </a:solidFill>
-                <a:latin typeface="+mn-lt"/>
-                <a:ea typeface="+mn-ea"/>
-                <a:cs typeface="+mn-cs"/>
-              </a:defRPr>
-            </a:lvl7pPr>
-            <a:lvl8pPr marL="3429000" indent="-228600" algn="l" defTabSz="914400" rtl="0" eaLnBrk="1" latinLnBrk="0" hangingPunct="1">
-              <a:lnSpc>
-                <a:spcPct val="90000"/>
-              </a:lnSpc>
-              <a:spcBef>
-                <a:spcPct val="30000"/>
-              </a:spcBef>
-              <a:buFont typeface="Arial" panose="020B0604020202020204" pitchFamily="34" charset="0"/>
-              <a:buChar char="•"/>
-              <a:defRPr sz="1800" kern="1200">
-                <a:solidFill>
-                  <a:schemeClr val="tx1"/>
-                </a:solidFill>
-                <a:latin typeface="+mn-lt"/>
-                <a:ea typeface="+mn-ea"/>
-                <a:cs typeface="+mn-cs"/>
-              </a:defRPr>
-            </a:lvl8pPr>
-            <a:lvl9pPr marL="3886200" indent="-228600" algn="l" defTabSz="914400" rtl="0" eaLnBrk="1" latinLnBrk="0" hangingPunct="1">
-              <a:lnSpc>
-                <a:spcPct val="90000"/>
-              </a:lnSpc>
-              <a:spcBef>
-                <a:spcPct val="30000"/>
-              </a:spcBef>
-              <a:buFont typeface="Arial" panose="020B0604020202020204" pitchFamily="34" charset="0"/>
-              <a:buChar char="•"/>
-              <a:defRPr sz="1800" kern="1200">
-                <a:solidFill>
-                  <a:schemeClr val="tx1"/>
-                </a:solidFill>
-                <a:latin typeface="+mn-lt"/>
-                <a:ea typeface="+mn-ea"/>
-                <a:cs typeface="+mn-cs"/>
-              </a:defRPr>
-            </a:lvl9pPr>
-          </a:lstStyle>
-          <a:p>
-            <a:pPr marL="0" lvl="0" indent="0">
-              <a:spcAft>
-                <a:spcPts val="600"/>
-              </a:spcAft>
-              <a:buNone/>
-              <a:defRPr/>
-            </a:pPr>
-            <a:r>
-              <a:rPr lang="en-US" sz="1100" dirty="0">
-                <a:latin typeface="Segoe UI" panose="020B0502040204020203" pitchFamily="34" charset="0"/>
-                <a:cs typeface="Segoe UI" panose="020B0502040204020203" pitchFamily="34" charset="0"/>
-              </a:rPr>
-              <a:t>A class (or method) should only have one responsibility hence only one reason to change.</a:t>
-            </a:r>
-          </a:p>
-          <a:p>
-            <a:pPr marL="0" lvl="0" indent="0">
-              <a:spcAft>
-                <a:spcPts val="600"/>
-              </a:spcAft>
-              <a:buNone/>
-              <a:defRPr/>
-            </a:pPr>
-            <a:r>
-              <a:rPr lang="en-US" sz="1100" dirty="0">
-                <a:solidFill>
-                  <a:schemeClr val="accent4"/>
-                </a:solidFill>
-                <a:latin typeface="Segoe UI" panose="020B0502040204020203" pitchFamily="34" charset="0"/>
-                <a:cs typeface="Segoe UI" panose="020B0502040204020203" pitchFamily="34" charset="0"/>
-              </a:rPr>
-              <a:t>Misinterpretation</a:t>
-            </a:r>
-            <a:r>
-              <a:rPr lang="en-US" sz="1100" dirty="0">
-                <a:latin typeface="Segoe UI" panose="020B0502040204020203" pitchFamily="34" charset="0"/>
-                <a:cs typeface="Segoe UI" panose="020B0502040204020203" pitchFamily="34" charset="0"/>
-              </a:rPr>
-              <a:t> – Most developers interpret to mean that a class should perform only one task. But it's not only classes, functions you implement in code during development should also perform only one task. So one should interpret it as meaning that an implementation should perform only one task.</a:t>
-            </a:r>
-          </a:p>
-          <a:p>
-            <a:pPr marL="0" lvl="0" indent="0">
-              <a:spcAft>
-                <a:spcPts val="600"/>
-              </a:spcAft>
-              <a:buNone/>
-              <a:defRPr/>
-            </a:pPr>
-            <a:r>
-              <a:rPr lang="en-US" sz="1100" dirty="0">
-                <a:solidFill>
-                  <a:schemeClr val="accent4"/>
-                </a:solidFill>
-                <a:latin typeface="Segoe UI" panose="020B0502040204020203" pitchFamily="34" charset="0"/>
-                <a:cs typeface="Segoe UI" panose="020B0502040204020203" pitchFamily="34" charset="0"/>
-              </a:rPr>
-              <a:t>Benefits</a:t>
-            </a:r>
-            <a:r>
-              <a:rPr lang="en-US" sz="1100" dirty="0">
-                <a:latin typeface="Segoe UI" panose="020B0502040204020203" pitchFamily="34" charset="0"/>
-                <a:cs typeface="Segoe UI" panose="020B0502040204020203" pitchFamily="34" charset="0"/>
-              </a:rPr>
-              <a:t>:</a:t>
-            </a:r>
-          </a:p>
-          <a:p>
-            <a:pPr>
-              <a:spcAft>
-                <a:spcPts val="600"/>
-              </a:spcAft>
-              <a:defRPr/>
-            </a:pPr>
-            <a:r>
-              <a:rPr lang="en-US" sz="1100" dirty="0">
-                <a:latin typeface="Segoe UI" panose="020B0502040204020203" pitchFamily="34" charset="0"/>
-                <a:cs typeface="Segoe UI" panose="020B0502040204020203" pitchFamily="34" charset="0"/>
-              </a:rPr>
-              <a:t>Easier to understand for a new teammate.</a:t>
-            </a:r>
-          </a:p>
-          <a:p>
-            <a:pPr>
-              <a:spcAft>
-                <a:spcPts val="600"/>
-              </a:spcAft>
-              <a:defRPr/>
-            </a:pPr>
-            <a:r>
-              <a:rPr lang="en-US" sz="1100" dirty="0">
-                <a:latin typeface="Segoe UI" panose="020B0502040204020203" pitchFamily="34" charset="0"/>
-                <a:cs typeface="Segoe UI" panose="020B0502040204020203" pitchFamily="34" charset="0"/>
-              </a:rPr>
-              <a:t>Maintain is easy as it change less frequently.</a:t>
-            </a:r>
-          </a:p>
-          <a:p>
-            <a:pPr>
-              <a:spcAft>
-                <a:spcPts val="600"/>
-              </a:spcAft>
-              <a:defRPr/>
-            </a:pPr>
-            <a:r>
-              <a:rPr lang="en-US" sz="1100" dirty="0">
-                <a:latin typeface="Segoe UI" panose="020B0502040204020203" pitchFamily="34" charset="0"/>
-                <a:cs typeface="Segoe UI" panose="020B0502040204020203" pitchFamily="34" charset="0"/>
-              </a:rPr>
-              <a:t>Easier to Test</a:t>
-            </a:r>
-          </a:p>
-          <a:p>
-            <a:pPr marL="0" indent="0">
-              <a:spcAft>
-                <a:spcPts val="600"/>
-              </a:spcAft>
-              <a:buNone/>
-              <a:defRPr/>
-            </a:pPr>
-            <a:r>
-              <a:rPr lang="en-US" sz="1100" dirty="0">
-                <a:solidFill>
-                  <a:schemeClr val="accent4"/>
-                </a:solidFill>
-                <a:latin typeface="Segoe UI" panose="020B0502040204020203" pitchFamily="34" charset="0"/>
-                <a:cs typeface="Segoe UI" panose="020B0502040204020203" pitchFamily="34" charset="0"/>
-              </a:rPr>
-              <a:t>How to determine?</a:t>
-            </a:r>
-          </a:p>
-          <a:p>
-            <a:pPr>
-              <a:spcAft>
-                <a:spcPts val="600"/>
-              </a:spcAft>
-              <a:defRPr/>
-            </a:pPr>
-            <a:r>
-              <a:rPr lang="en-US" sz="1100" dirty="0">
-                <a:solidFill>
-                  <a:schemeClr val="tx1"/>
-                </a:solidFill>
-                <a:latin typeface="Segoe UI" panose="020B0502040204020203" pitchFamily="34" charset="0"/>
-                <a:cs typeface="Segoe UI" panose="020B0502040204020203" pitchFamily="34" charset="0"/>
-              </a:rPr>
-              <a:t>Class description should not contain words like “And , Or, But or If”.</a:t>
-            </a:r>
-          </a:p>
-          <a:p>
-            <a:pPr>
-              <a:spcAft>
-                <a:spcPts val="600"/>
-              </a:spcAft>
-              <a:defRPr/>
-            </a:pPr>
-            <a:r>
-              <a:rPr lang="en-US" sz="1100" dirty="0">
-                <a:solidFill>
-                  <a:schemeClr val="tx1"/>
-                </a:solidFill>
-                <a:latin typeface="Segoe UI" panose="020B0502040204020203" pitchFamily="34" charset="0"/>
-                <a:cs typeface="Segoe UI" panose="020B0502040204020203" pitchFamily="34" charset="0"/>
-              </a:rPr>
-              <a:t>Class constructor/method contains too many parameters.</a:t>
-            </a:r>
-          </a:p>
-          <a:p>
-            <a:pPr>
-              <a:spcAft>
-                <a:spcPts val="600"/>
-              </a:spcAft>
-              <a:defRPr/>
-            </a:pPr>
-            <a:endParaRPr lang="en-US" sz="1100" dirty="0">
-              <a:solidFill>
-                <a:schemeClr val="tx1"/>
-              </a:solidFill>
-              <a:latin typeface="Segoe UI" panose="020B0502040204020203" pitchFamily="34" charset="0"/>
-              <a:cs typeface="Segoe UI" panose="020B0502040204020203" pitchFamily="34" charset="0"/>
-            </a:endParaRPr>
-          </a:p>
-          <a:p>
-            <a:pPr marL="0" lvl="0" indent="0">
-              <a:spcAft>
-                <a:spcPts val="600"/>
-              </a:spcAft>
-              <a:buNone/>
-              <a:defRPr/>
-            </a:pPr>
-            <a:endParaRPr lang="en-US" sz="1100" dirty="0">
-              <a:latin typeface="Segoe UI" panose="020B0502040204020203" pitchFamily="34" charset="0"/>
-              <a:cs typeface="Segoe UI" panose="020B0502040204020203" pitchFamily="34" charset="0"/>
-            </a:endParaRPr>
-          </a:p>
-        </p:txBody>
-      </p:sp>
-      <p:pic>
-        <p:nvPicPr>
-          <p:cNvPr id="4100" name="Picture 4" descr="largest victorinox swiss army knife Offers online OFF 61%">
-            <a:extLst>
-              <a:ext uri="{FF2B5EF4-FFF2-40B4-BE49-F238E27FC236}">
-                <a16:creationId xmlns:a16="http://schemas.microsoft.com/office/drawing/2014/main" id="{5D6F8893-F919-A1F7-F768-1053CB906DFB}"/>
-              </a:ext>
-            </a:extLst>
-          </p:cNvPr>
-          <p:cNvPicPr>
-            <a:picLocks noChangeAspect="1" noChangeArrowheads="1"/>
-          </p:cNvPicPr>
-          <p:nvPr/>
-        </p:nvPicPr>
-        <p:blipFill>
-          <a:blip r:embed="rId2">
-            <a:extLst>
-              <a:ext uri="{28A0092B-C50C-407E-A947-70E740481C1C}">
-                <a14:useLocalDpi xmlns:a14="http://schemas.microsoft.com/office/drawing/2010/main" val="0"/>
-              </a:ext>
-            </a:extLst>
-          </a:blip>
-          <a:srcRect/>
-          <a:stretch>
-            <a:fillRect/>
-          </a:stretch>
-        </p:blipFill>
-        <p:spPr bwMode="auto">
-          <a:xfrm>
-            <a:off x="6371208" y="1238745"/>
-            <a:ext cx="3225553" cy="2272222"/>
-          </a:xfrm>
-          <a:prstGeom prst="rect">
-            <a:avLst/>
-          </a:prstGeom>
-          <a:noFill/>
-          <a:extLst>
-            <a:ext uri="{909E8E84-426E-40DD-AFC4-6F175D3DCCD1}">
-              <a14:hiddenFill xmlns:a14="http://schemas.microsoft.com/office/drawing/2010/main">
-                <a:solidFill>
-                  <a:srgbClr val="FFFFFF"/>
-                </a:solidFill>
-              </a14:hiddenFill>
-            </a:ext>
-          </a:extLst>
-        </p:spPr>
-      </p:pic>
-      <p:pic>
-        <p:nvPicPr>
-          <p:cNvPr id="1026" name="Picture 2">
-            <a:extLst>
-              <a:ext uri="{FF2B5EF4-FFF2-40B4-BE49-F238E27FC236}">
-                <a16:creationId xmlns:a16="http://schemas.microsoft.com/office/drawing/2014/main" id="{125660DA-606B-3A84-0AA4-3B729DBB1A06}"/>
-              </a:ext>
-            </a:extLst>
-          </p:cNvPr>
-          <p:cNvPicPr>
-            <a:picLocks noChangeAspect="1" noChangeArrowheads="1"/>
-          </p:cNvPicPr>
-          <p:nvPr/>
-        </p:nvPicPr>
-        <p:blipFill>
-          <a:blip r:embed="rId3">
-            <a:extLst>
-              <a:ext uri="{28A0092B-C50C-407E-A947-70E740481C1C}">
-                <a14:useLocalDpi xmlns:a14="http://schemas.microsoft.com/office/drawing/2010/main" val="0"/>
-              </a:ext>
-            </a:extLst>
-          </a:blip>
-          <a:srcRect/>
-          <a:stretch>
-            <a:fillRect/>
-          </a:stretch>
-        </p:blipFill>
-        <p:spPr bwMode="auto">
-          <a:xfrm>
-            <a:off x="6433352" y="3661577"/>
-            <a:ext cx="4290874" cy="2646039"/>
-          </a:xfrm>
-          <a:prstGeom prst="rect">
-            <a:avLst/>
-          </a:prstGeom>
-          <a:noFill/>
-          <a:extLst>
-            <a:ext uri="{909E8E84-426E-40DD-AFC4-6F175D3DCCD1}">
-              <a14:hiddenFill xmlns:a14="http://schemas.microsoft.com/office/drawing/2010/main">
-                <a:solidFill>
-                  <a:srgbClr val="FFFFFF"/>
-                </a:solidFill>
-              </a14:hiddenFill>
-            </a:ext>
-          </a:extLst>
-        </p:spPr>
-      </p:pic>
-    </p:spTree>
-    <p:extLst>
-      <p:ext uri="{BB962C8B-B14F-4D97-AF65-F5344CB8AC3E}">
-        <p14:creationId xmlns:p14="http://schemas.microsoft.com/office/powerpoint/2010/main" val="2596833607"/>
-      </p:ext>
-    </p:extLst>
-  </p:cSld>
-  <p:clrMapOvr>
-    <a:masterClrMapping/>
-  </p:clrMapOvr>
 </p:sld>
 </file>
 

</xml_diff>

<commit_message>
PPT and Demo for Dependency Injection and Ioc Container
</commit_message>
<xml_diff>
--- a/SOLID PRINCIPLES_NEW.pptx
+++ b/SOLID PRINCIPLES_NEW.pptx
@@ -281,7 +281,7 @@
           <a:p>
             <a:fld id="{80680FBE-A8DF-4758-9AC4-3A9E1039168F}" type="datetimeFigureOut">
               <a:rPr lang="en-US" smtClean="0"/>
-              <a:t>30/06/2022</a:t>
+              <a:t>02/07/2022</a:t>
             </a:fld>
             <a:endParaRPr lang="en-US" dirty="0"/>
           </a:p>
@@ -446,7 +446,7 @@
           <a:p>
             <a:fld id="{EC13577B-6902-467D-A26C-08A0DD5E4E03}" type="datetimeFigureOut">
               <a:rPr lang="en-US" smtClean="0"/>
-              <a:t>30/06/2022</a:t>
+              <a:t>02/07/2022</a:t>
             </a:fld>
             <a:endParaRPr lang="en-US" dirty="0"/>
           </a:p>
@@ -1330,7 +1330,7 @@
             <a:fld id="{8BEEBAAA-29B5-4AF5-BC5F-7E580C29002D}" type="datetimeFigureOut">
               <a:rPr lang="en-US" smtClean="0"/>
               <a:pPr/>
-              <a:t>30/06/2022</a:t>
+              <a:t>02/07/2022</a:t>
             </a:fld>
             <a:endParaRPr lang="en-US" dirty="0"/>
           </a:p>
@@ -1956,7 +1956,7 @@
             <a:fld id="{8BEEBAAA-29B5-4AF5-BC5F-7E580C29002D}" type="datetimeFigureOut">
               <a:rPr lang="en-US" smtClean="0"/>
               <a:pPr/>
-              <a:t>30/06/2022</a:t>
+              <a:t>02/07/2022</a:t>
             </a:fld>
             <a:endParaRPr lang="en-US" dirty="0"/>
           </a:p>
@@ -3369,7 +3369,7 @@
           <a:effectLst/>
           <a:extLst>
             <a:ext uri="{C572A759-6A51-4108-AA02-DFA0A04FC94B}">
-              <ma14:wrappingTextBoxFlag xmlns="" xmlns:ma14="http://schemas.microsoft.com/office/mac/drawingml/2011/main"/>
+              <ma14:wrappingTextBoxFlag xmlns:ma14="http://schemas.microsoft.com/office/mac/drawingml/2011/main" xmlns=""/>
             </a:ext>
           </a:extLst>
         </p:spPr>
@@ -4136,7 +4136,7 @@
           <a:effectLst/>
           <a:extLst>
             <a:ext uri="{C572A759-6A51-4108-AA02-DFA0A04FC94B}">
-              <ma14:wrappingTextBoxFlag xmlns="" xmlns:ma14="http://schemas.microsoft.com/office/mac/drawingml/2011/main"/>
+              <ma14:wrappingTextBoxFlag xmlns:ma14="http://schemas.microsoft.com/office/mac/drawingml/2011/main" xmlns=""/>
             </a:ext>
           </a:extLst>
         </p:spPr>
@@ -5042,7 +5042,7 @@
           <a:effectLst/>
           <a:extLst>
             <a:ext uri="{C572A759-6A51-4108-AA02-DFA0A04FC94B}">
-              <ma14:wrappingTextBoxFlag xmlns="" xmlns:ma14="http://schemas.microsoft.com/office/mac/drawingml/2011/main"/>
+              <ma14:wrappingTextBoxFlag xmlns:ma14="http://schemas.microsoft.com/office/mac/drawingml/2011/main" xmlns=""/>
             </a:ext>
           </a:extLst>
         </p:spPr>
@@ -5805,7 +5805,7 @@
           <a:effectLst/>
           <a:extLst>
             <a:ext uri="{C572A759-6A51-4108-AA02-DFA0A04FC94B}">
-              <ma14:wrappingTextBoxFlag xmlns="" xmlns:ma14="http://schemas.microsoft.com/office/mac/drawingml/2011/main"/>
+              <ma14:wrappingTextBoxFlag xmlns:ma14="http://schemas.microsoft.com/office/mac/drawingml/2011/main" xmlns=""/>
             </a:ext>
           </a:extLst>
         </p:spPr>
@@ -6598,7 +6598,7 @@
           <a:effectLst/>
           <a:extLst>
             <a:ext uri="{C572A759-6A51-4108-AA02-DFA0A04FC94B}">
-              <ma14:wrappingTextBoxFlag xmlns="" xmlns:ma14="http://schemas.microsoft.com/office/mac/drawingml/2011/main"/>
+              <ma14:wrappingTextBoxFlag xmlns:ma14="http://schemas.microsoft.com/office/mac/drawingml/2011/main" xmlns=""/>
             </a:ext>
           </a:extLst>
         </p:spPr>
@@ -7555,166 +7555,6 @@
           </a:prstGeom>
         </p:spPr>
       </p:pic>
-      <p:pic>
-        <p:nvPicPr>
-          <p:cNvPr id="5" name="Picture 4">
-            <a:extLst>
-              <a:ext uri="{FF2B5EF4-FFF2-40B4-BE49-F238E27FC236}">
-                <a16:creationId xmlns:a16="http://schemas.microsoft.com/office/drawing/2014/main" id="{A95F0C6D-3E5D-017C-ED93-55FBDF0C04EC}"/>
-              </a:ext>
-            </a:extLst>
-          </p:cNvPr>
-          <p:cNvPicPr>
-            <a:picLocks noChangeAspect="1"/>
-          </p:cNvPicPr>
-          <p:nvPr/>
-        </p:nvPicPr>
-        <p:blipFill>
-          <a:blip r:embed="rId3"/>
-          <a:stretch>
-            <a:fillRect/>
-          </a:stretch>
-        </p:blipFill>
-        <p:spPr>
-          <a:xfrm>
-            <a:off x="365137" y="5035750"/>
-            <a:ext cx="5394711" cy="175616"/>
-          </a:xfrm>
-          <a:prstGeom prst="rect">
-            <a:avLst/>
-          </a:prstGeom>
-        </p:spPr>
-      </p:pic>
-      <p:pic>
-        <p:nvPicPr>
-          <p:cNvPr id="6" name="Picture 5">
-            <a:extLst>
-              <a:ext uri="{FF2B5EF4-FFF2-40B4-BE49-F238E27FC236}">
-                <a16:creationId xmlns:a16="http://schemas.microsoft.com/office/drawing/2014/main" id="{0ECA48D0-FACD-1CEA-B014-E4BE55CF588F}"/>
-              </a:ext>
-            </a:extLst>
-          </p:cNvPr>
-          <p:cNvPicPr>
-            <a:picLocks noChangeAspect="1"/>
-          </p:cNvPicPr>
-          <p:nvPr/>
-        </p:nvPicPr>
-        <p:blipFill>
-          <a:blip r:embed="rId4"/>
-          <a:stretch>
-            <a:fillRect/>
-          </a:stretch>
-        </p:blipFill>
-        <p:spPr>
-          <a:xfrm>
-            <a:off x="407764" y="6174374"/>
-            <a:ext cx="5352084" cy="153267"/>
-          </a:xfrm>
-          <a:prstGeom prst="rect">
-            <a:avLst/>
-          </a:prstGeom>
-        </p:spPr>
-      </p:pic>
-      <p:sp>
-        <p:nvSpPr>
-          <p:cNvPr id="7" name="Oval 6">
-            <a:extLst>
-              <a:ext uri="{FF2B5EF4-FFF2-40B4-BE49-F238E27FC236}">
-                <a16:creationId xmlns:a16="http://schemas.microsoft.com/office/drawing/2014/main" id="{E2179ED9-D388-9559-35BC-954B1EBB707E}"/>
-              </a:ext>
-            </a:extLst>
-          </p:cNvPr>
-          <p:cNvSpPr/>
-          <p:nvPr/>
-        </p:nvSpPr>
-        <p:spPr>
-          <a:xfrm>
-            <a:off x="1491447" y="4580878"/>
-            <a:ext cx="2539013" cy="292964"/>
-          </a:xfrm>
-          <a:prstGeom prst="ellipse">
-            <a:avLst/>
-          </a:prstGeom>
-        </p:spPr>
-        <p:style>
-          <a:lnRef idx="2">
-            <a:schemeClr val="accent1">
-              <a:shade val="50000"/>
-            </a:schemeClr>
-          </a:lnRef>
-          <a:fillRef idx="1">
-            <a:schemeClr val="accent1"/>
-          </a:fillRef>
-          <a:effectRef idx="0">
-            <a:schemeClr val="accent1"/>
-          </a:effectRef>
-          <a:fontRef idx="minor">
-            <a:schemeClr val="lt1"/>
-          </a:fontRef>
-        </p:style>
-        <p:txBody>
-          <a:bodyPr rtlCol="0" anchor="ctr"/>
-          <a:lstStyle/>
-          <a:p>
-            <a:pPr algn="ctr"/>
-            <a:r>
-              <a:rPr lang="en-US" dirty="0"/>
-              <a:t>Before Change</a:t>
-            </a:r>
-            <a:endParaRPr lang="en-IN" dirty="0"/>
-          </a:p>
-        </p:txBody>
-      </p:sp>
-      <p:sp>
-        <p:nvSpPr>
-          <p:cNvPr id="9" name="Oval 8">
-            <a:extLst>
-              <a:ext uri="{FF2B5EF4-FFF2-40B4-BE49-F238E27FC236}">
-                <a16:creationId xmlns:a16="http://schemas.microsoft.com/office/drawing/2014/main" id="{4D2DAC88-F166-B320-04F6-95DC5E910840}"/>
-              </a:ext>
-            </a:extLst>
-          </p:cNvPr>
-          <p:cNvSpPr/>
-          <p:nvPr/>
-        </p:nvSpPr>
-        <p:spPr>
-          <a:xfrm>
-            <a:off x="1491446" y="5678911"/>
-            <a:ext cx="2539013" cy="292964"/>
-          </a:xfrm>
-          <a:prstGeom prst="ellipse">
-            <a:avLst/>
-          </a:prstGeom>
-        </p:spPr>
-        <p:style>
-          <a:lnRef idx="2">
-            <a:schemeClr val="accent1">
-              <a:shade val="50000"/>
-            </a:schemeClr>
-          </a:lnRef>
-          <a:fillRef idx="1">
-            <a:schemeClr val="accent1"/>
-          </a:fillRef>
-          <a:effectRef idx="0">
-            <a:schemeClr val="accent1"/>
-          </a:effectRef>
-          <a:fontRef idx="minor">
-            <a:schemeClr val="lt1"/>
-          </a:fontRef>
-        </p:style>
-        <p:txBody>
-          <a:bodyPr rtlCol="0" anchor="ctr"/>
-          <a:lstStyle/>
-          <a:p>
-            <a:pPr algn="ctr"/>
-            <a:r>
-              <a:rPr lang="en-US" dirty="0"/>
-              <a:t>After Change</a:t>
-            </a:r>
-            <a:endParaRPr lang="en-IN" dirty="0"/>
-          </a:p>
-        </p:txBody>
-      </p:sp>
     </p:spTree>
     <p:extLst>
       <p:ext uri="{BB962C8B-B14F-4D97-AF65-F5344CB8AC3E}">
@@ -9232,7 +9072,7 @@
           <a:effectLst/>
           <a:extLst>
             <a:ext uri="{C572A759-6A51-4108-AA02-DFA0A04FC94B}">
-              <ma14:wrappingTextBoxFlag xmlns="" xmlns:ma14="http://schemas.microsoft.com/office/mac/drawingml/2011/main"/>
+              <ma14:wrappingTextBoxFlag xmlns:ma14="http://schemas.microsoft.com/office/mac/drawingml/2011/main" xmlns=""/>
             </a:ext>
           </a:extLst>
         </p:spPr>
@@ -9363,7 +9203,7 @@
           <a:effectLst/>
           <a:extLst>
             <a:ext uri="{C572A759-6A51-4108-AA02-DFA0A04FC94B}">
-              <ma14:wrappingTextBoxFlag xmlns="" xmlns:ma14="http://schemas.microsoft.com/office/mac/drawingml/2011/main"/>
+              <ma14:wrappingTextBoxFlag xmlns:ma14="http://schemas.microsoft.com/office/mac/drawingml/2011/main" xmlns=""/>
             </a:ext>
           </a:extLst>
         </p:spPr>

</xml_diff>